<commit_message>
Minor updates and notes
</commit_message>
<xml_diff>
--- a/presentation.pptx
+++ b/presentation.pptx
@@ -28,36 +28,36 @@
     <p:sldId id="354" r:id="rId19"/>
     <p:sldId id="324" r:id="rId20"/>
     <p:sldId id="375" r:id="rId21"/>
-    <p:sldId id="320" r:id="rId22"/>
-    <p:sldId id="374" r:id="rId23"/>
-    <p:sldId id="361" r:id="rId24"/>
-    <p:sldId id="376" r:id="rId25"/>
-    <p:sldId id="362" r:id="rId26"/>
-    <p:sldId id="321" r:id="rId27"/>
-    <p:sldId id="363" r:id="rId28"/>
-    <p:sldId id="364" r:id="rId29"/>
-    <p:sldId id="368" r:id="rId30"/>
-    <p:sldId id="369" r:id="rId31"/>
-    <p:sldId id="366" r:id="rId32"/>
-    <p:sldId id="367" r:id="rId33"/>
-    <p:sldId id="371" r:id="rId34"/>
-    <p:sldId id="372" r:id="rId35"/>
-    <p:sldId id="387" r:id="rId36"/>
-    <p:sldId id="373" r:id="rId37"/>
-    <p:sldId id="365" r:id="rId38"/>
-    <p:sldId id="377" r:id="rId39"/>
-    <p:sldId id="379" r:id="rId40"/>
-    <p:sldId id="380" r:id="rId41"/>
-    <p:sldId id="384" r:id="rId42"/>
-    <p:sldId id="385" r:id="rId43"/>
-    <p:sldId id="381" r:id="rId44"/>
-    <p:sldId id="382" r:id="rId45"/>
-    <p:sldId id="383" r:id="rId46"/>
-    <p:sldId id="386" r:id="rId47"/>
-    <p:sldId id="388" r:id="rId48"/>
-    <p:sldId id="378" r:id="rId49"/>
-    <p:sldId id="323" r:id="rId50"/>
-    <p:sldId id="389" r:id="rId51"/>
+    <p:sldId id="397" r:id="rId22"/>
+    <p:sldId id="320" r:id="rId23"/>
+    <p:sldId id="374" r:id="rId24"/>
+    <p:sldId id="361" r:id="rId25"/>
+    <p:sldId id="376" r:id="rId26"/>
+    <p:sldId id="362" r:id="rId27"/>
+    <p:sldId id="321" r:id="rId28"/>
+    <p:sldId id="363" r:id="rId29"/>
+    <p:sldId id="364" r:id="rId30"/>
+    <p:sldId id="368" r:id="rId31"/>
+    <p:sldId id="369" r:id="rId32"/>
+    <p:sldId id="366" r:id="rId33"/>
+    <p:sldId id="367" r:id="rId34"/>
+    <p:sldId id="371" r:id="rId35"/>
+    <p:sldId id="372" r:id="rId36"/>
+    <p:sldId id="387" r:id="rId37"/>
+    <p:sldId id="373" r:id="rId38"/>
+    <p:sldId id="365" r:id="rId39"/>
+    <p:sldId id="377" r:id="rId40"/>
+    <p:sldId id="379" r:id="rId41"/>
+    <p:sldId id="380" r:id="rId42"/>
+    <p:sldId id="384" r:id="rId43"/>
+    <p:sldId id="385" r:id="rId44"/>
+    <p:sldId id="381" r:id="rId45"/>
+    <p:sldId id="382" r:id="rId46"/>
+    <p:sldId id="383" r:id="rId47"/>
+    <p:sldId id="386" r:id="rId48"/>
+    <p:sldId id="388" r:id="rId49"/>
+    <p:sldId id="378" r:id="rId50"/>
+    <p:sldId id="323" r:id="rId51"/>
     <p:sldId id="390" r:id="rId52"/>
     <p:sldId id="391" r:id="rId53"/>
     <p:sldId id="394" r:id="rId54"/>
@@ -201,6 +201,7 @@
         <p14:section name="Identification Phase" id="{67637D1A-0E06-48C2-88F0-4CC830FDB808}">
           <p14:sldIdLst>
             <p14:sldId id="375"/>
+            <p14:sldId id="397"/>
             <p14:sldId id="320"/>
             <p14:sldId id="374"/>
             <p14:sldId id="361"/>
@@ -242,7 +243,6 @@
           <p14:sldIdLst>
             <p14:sldId id="378"/>
             <p14:sldId id="323"/>
-            <p14:sldId id="389"/>
             <p14:sldId id="390"/>
             <p14:sldId id="391"/>
             <p14:sldId id="394"/>
@@ -18602,7 +18602,7 @@
           <a:p>
             <a:fld id="{D987070D-87AF-4443-8990-425EA27CC244}" type="datetimeFigureOut">
               <a:rPr lang="de-CH" smtClean="0"/>
-              <a:t>27.05.2016</a:t>
+              <a:t>30.05.2016</a:t>
             </a:fld>
             <a:endParaRPr lang="de-CH"/>
           </a:p>
@@ -21185,6 +21185,14 @@
           <a:bodyPr/>
           <a:lstStyle/>
           <a:p>
+            <a:r>
+              <a:rPr lang="en-US" dirty="0"/>
+              <a:t>ASYNC</a:t>
+            </a:r>
+            <a:r>
+              <a:rPr lang="en-US" baseline="0" dirty="0"/>
+              <a:t> ALL THE THINGS</a:t>
+            </a:r>
             <a:endParaRPr lang="de-CH" dirty="0"/>
           </a:p>
         </p:txBody>
@@ -21215,7 +21223,7 @@
     </p:spTree>
     <p:extLst>
       <p:ext uri="{BB962C8B-B14F-4D97-AF65-F5344CB8AC3E}">
-        <p14:creationId xmlns:p14="http://schemas.microsoft.com/office/powerpoint/2010/main" val="94328163"/>
+        <p14:creationId xmlns:p14="http://schemas.microsoft.com/office/powerpoint/2010/main" val="176274524"/>
       </p:ext>
     </p:extLst>
   </p:cSld>
@@ -21269,10 +21277,6 @@
           <a:bodyPr/>
           <a:lstStyle/>
           <a:p>
-            <a:r>
-              <a:rPr lang="en-US" dirty="0"/>
-              <a:t>Maybe leave this away?</a:t>
-            </a:r>
             <a:endParaRPr lang="de-CH" dirty="0"/>
           </a:p>
         </p:txBody>
@@ -21294,7 +21298,7 @@
           <a:p>
             <a:fld id="{9BCA07FD-5BD5-4529-84B0-48DD2C561176}" type="slidenum">
               <a:rPr lang="de-CH" smtClean="0"/>
-              <a:t>23</a:t>
+              <a:t>22</a:t>
             </a:fld>
             <a:endParaRPr lang="de-CH"/>
           </a:p>
@@ -21303,7 +21307,7 @@
     </p:spTree>
     <p:extLst>
       <p:ext uri="{BB962C8B-B14F-4D97-AF65-F5344CB8AC3E}">
-        <p14:creationId xmlns:p14="http://schemas.microsoft.com/office/powerpoint/2010/main" val="2271485313"/>
+        <p14:creationId xmlns:p14="http://schemas.microsoft.com/office/powerpoint/2010/main" val="94328163"/>
       </p:ext>
     </p:extLst>
   </p:cSld>
@@ -21359,61 +21363,7 @@
           <a:p>
             <a:r>
               <a:rPr lang="en-US" dirty="0"/>
-              <a:t>I show you a four-phased approach to evolving your code-base towards </a:t>
-            </a:r>
-            <a:r>
-              <a:rPr lang="en-US" dirty="0" err="1"/>
-              <a:t>async</a:t>
-            </a:r>
-            <a:r>
-              <a:rPr lang="en-US" dirty="0"/>
-              <a:t>/wait. In the identification phase, we classify the components which would benefit from </a:t>
-            </a:r>
-            <a:r>
-              <a:rPr lang="en-US" dirty="0" err="1"/>
-              <a:t>async</a:t>
-            </a:r>
-            <a:r>
-              <a:rPr lang="en-US" dirty="0"/>
-              <a:t>/await. In the exploration phase, we discover potential road blockers which might hinder the </a:t>
-            </a:r>
-            <a:r>
-              <a:rPr lang="en-US" dirty="0" err="1"/>
-              <a:t>async</a:t>
-            </a:r>
-            <a:r>
-              <a:rPr lang="en-US" dirty="0"/>
-              <a:t>/await adoption.</a:t>
-            </a:r>
-          </a:p>
-          <a:p>
-            <a:endParaRPr lang="en-US" dirty="0"/>
-          </a:p>
-          <a:p>
-            <a:r>
-              <a:rPr lang="en-US" dirty="0"/>
-              <a:t>In the obstacle phase, we learn to redesign parts of the code to remove the previously identified road blockers. In the bring-it-together phase, we gradually move the components which benefit the most from </a:t>
-            </a:r>
-            <a:r>
-              <a:rPr lang="en-US" dirty="0" err="1"/>
-              <a:t>async</a:t>
-            </a:r>
-            <a:r>
-              <a:rPr lang="en-US" dirty="0"/>
-              <a:t>/await to a full asynchronous API. Small steps. No Big Bang.</a:t>
-            </a:r>
-          </a:p>
-          <a:p>
-            <a:endParaRPr lang="en-US" dirty="0"/>
-          </a:p>
-          <a:p>
-            <a:r>
-              <a:rPr lang="en-US" dirty="0"/>
-              <a:t>Make a word</a:t>
-            </a:r>
-            <a:r>
-              <a:rPr lang="en-US" baseline="0" dirty="0"/>
-              <a:t> out of it</a:t>
+              <a:t>Maybe leave this away?</a:t>
             </a:r>
             <a:endParaRPr lang="de-CH" dirty="0"/>
           </a:p>
@@ -21445,7 +21395,7 @@
     </p:spTree>
     <p:extLst>
       <p:ext uri="{BB962C8B-B14F-4D97-AF65-F5344CB8AC3E}">
-        <p14:creationId xmlns:p14="http://schemas.microsoft.com/office/powerpoint/2010/main" val="3637497409"/>
+        <p14:creationId xmlns:p14="http://schemas.microsoft.com/office/powerpoint/2010/main" val="2271485313"/>
       </p:ext>
     </p:extLst>
   </p:cSld>
@@ -21501,16 +21451,61 @@
           <a:p>
             <a:r>
               <a:rPr lang="en-US" dirty="0"/>
-              <a:t>One way to do it is </a:t>
-            </a:r>
-            <a:r>
-              <a:rPr lang="en-US" sz="1200" dirty="0" err="1">
-                <a:solidFill>
-                  <a:schemeClr val="accent3"/>
-                </a:solidFill>
-                <a:latin typeface="Yanone Kaffeesatz Regular" panose="02000000000000000000" pitchFamily="2" charset="0"/>
-              </a:rPr>
-              <a:t>timeboxing</a:t>
+              <a:t>I show you a four-phased approach to evolving your code-base towards </a:t>
+            </a:r>
+            <a:r>
+              <a:rPr lang="en-US" dirty="0" err="1"/>
+              <a:t>async</a:t>
+            </a:r>
+            <a:r>
+              <a:rPr lang="en-US" dirty="0"/>
+              <a:t>/wait. In the identification phase, we classify the components which would benefit from </a:t>
+            </a:r>
+            <a:r>
+              <a:rPr lang="en-US" dirty="0" err="1"/>
+              <a:t>async</a:t>
+            </a:r>
+            <a:r>
+              <a:rPr lang="en-US" dirty="0"/>
+              <a:t>/await. In the exploration phase, we discover potential road blockers which might hinder the </a:t>
+            </a:r>
+            <a:r>
+              <a:rPr lang="en-US" dirty="0" err="1"/>
+              <a:t>async</a:t>
+            </a:r>
+            <a:r>
+              <a:rPr lang="en-US" dirty="0"/>
+              <a:t>/await adoption.</a:t>
+            </a:r>
+          </a:p>
+          <a:p>
+            <a:endParaRPr lang="en-US" dirty="0"/>
+          </a:p>
+          <a:p>
+            <a:r>
+              <a:rPr lang="en-US" dirty="0"/>
+              <a:t>In the obstacle phase, we learn to redesign parts of the code to remove the previously identified road blockers. In the bring-it-together phase, we gradually move the components which benefit the most from </a:t>
+            </a:r>
+            <a:r>
+              <a:rPr lang="en-US" dirty="0" err="1"/>
+              <a:t>async</a:t>
+            </a:r>
+            <a:r>
+              <a:rPr lang="en-US" dirty="0"/>
+              <a:t>/await to a full asynchronous API. Small steps. No Big Bang.</a:t>
+            </a:r>
+          </a:p>
+          <a:p>
+            <a:endParaRPr lang="en-US" dirty="0"/>
+          </a:p>
+          <a:p>
+            <a:r>
+              <a:rPr lang="en-US" dirty="0"/>
+              <a:t>Make a word</a:t>
+            </a:r>
+            <a:r>
+              <a:rPr lang="en-US" baseline="0" dirty="0"/>
+              <a:t> out of it</a:t>
             </a:r>
             <a:endParaRPr lang="de-CH" dirty="0"/>
           </a:p>
@@ -21542,7 +21537,7 @@
     </p:spTree>
     <p:extLst>
       <p:ext uri="{BB962C8B-B14F-4D97-AF65-F5344CB8AC3E}">
-        <p14:creationId xmlns:p14="http://schemas.microsoft.com/office/powerpoint/2010/main" val="2938123667"/>
+        <p14:creationId xmlns:p14="http://schemas.microsoft.com/office/powerpoint/2010/main" val="3637497409"/>
       </p:ext>
     </p:extLst>
   </p:cSld>
@@ -21598,17 +21593,33 @@
           <a:p>
             <a:r>
               <a:rPr lang="en-US" dirty="0"/>
-              <a:t>Maybe group</a:t>
-            </a:r>
-            <a:r>
-              <a:rPr lang="en-US" baseline="0" dirty="0"/>
-              <a:t> the topics??</a:t>
-            </a:r>
-          </a:p>
-          <a:p>
-            <a:r>
-              <a:rPr lang="en-US" baseline="0" dirty="0"/>
-              <a:t>Maybe repeat again</a:t>
+              <a:t>One way to do it is </a:t>
+            </a:r>
+            <a:r>
+              <a:rPr lang="en-US" sz="1200" dirty="0" err="1">
+                <a:solidFill>
+                  <a:schemeClr val="accent3"/>
+                </a:solidFill>
+                <a:latin typeface="Yanone Kaffeesatz Regular" panose="02000000000000000000" pitchFamily="2" charset="0"/>
+              </a:rPr>
+              <a:t>timeboxing</a:t>
+            </a:r>
+            <a:br>
+              <a:rPr lang="en-US" sz="1200" dirty="0">
+                <a:solidFill>
+                  <a:schemeClr val="accent3"/>
+                </a:solidFill>
+                <a:latin typeface="Yanone Kaffeesatz Regular" panose="02000000000000000000" pitchFamily="2" charset="0"/>
+              </a:rPr>
+            </a:br>
+            <a:r>
+              <a:rPr lang="en-US" sz="1200" dirty="0">
+                <a:solidFill>
+                  <a:schemeClr val="accent3"/>
+                </a:solidFill>
+                <a:latin typeface="Yanone Kaffeesatz Regular" panose="02000000000000000000" pitchFamily="2" charset="0"/>
+              </a:rPr>
+              <a:t>Efferent and Afferent coupling?</a:t>
             </a:r>
             <a:endParaRPr lang="de-CH" dirty="0"/>
           </a:p>
@@ -21631,7 +21642,7 @@
           <a:p>
             <a:fld id="{9BCA07FD-5BD5-4529-84B0-48DD2C561176}" type="slidenum">
               <a:rPr lang="de-CH" smtClean="0"/>
-              <a:t>28</a:t>
+              <a:t>26</a:t>
             </a:fld>
             <a:endParaRPr lang="de-CH"/>
           </a:p>
@@ -21640,7 +21651,7 @@
     </p:spTree>
     <p:extLst>
       <p:ext uri="{BB962C8B-B14F-4D97-AF65-F5344CB8AC3E}">
-        <p14:creationId xmlns:p14="http://schemas.microsoft.com/office/powerpoint/2010/main" val="1013340820"/>
+        <p14:creationId xmlns:p14="http://schemas.microsoft.com/office/powerpoint/2010/main" val="2938123667"/>
       </p:ext>
     </p:extLst>
   </p:cSld>
@@ -21694,6 +21705,20 @@
           <a:bodyPr/>
           <a:lstStyle/>
           <a:p>
+            <a:r>
+              <a:rPr lang="en-US" dirty="0"/>
+              <a:t>Maybe group</a:t>
+            </a:r>
+            <a:r>
+              <a:rPr lang="en-US" baseline="0" dirty="0"/>
+              <a:t> the topics??</a:t>
+            </a:r>
+          </a:p>
+          <a:p>
+            <a:r>
+              <a:rPr lang="en-US" baseline="0" dirty="0"/>
+              <a:t>Maybe repeat again</a:t>
+            </a:r>
             <a:endParaRPr lang="de-CH" dirty="0"/>
           </a:p>
         </p:txBody>
@@ -21724,7 +21749,7 @@
     </p:spTree>
     <p:extLst>
       <p:ext uri="{BB962C8B-B14F-4D97-AF65-F5344CB8AC3E}">
-        <p14:creationId xmlns:p14="http://schemas.microsoft.com/office/powerpoint/2010/main" val="2555691090"/>
+        <p14:creationId xmlns:p14="http://schemas.microsoft.com/office/powerpoint/2010/main" val="1013340820"/>
       </p:ext>
     </p:extLst>
   </p:cSld>
@@ -21778,107 +21803,6 @@
           <a:bodyPr/>
           <a:lstStyle/>
           <a:p>
-            <a:r>
-              <a:rPr lang="en-US" sz="1200" b="0" i="1" kern="1200" dirty="0">
-                <a:solidFill>
-                  <a:schemeClr val="tx1"/>
-                </a:solidFill>
-                <a:effectLst/>
-                <a:latin typeface="+mn-lt"/>
-                <a:ea typeface="+mn-ea"/>
-                <a:cs typeface="+mn-cs"/>
-              </a:rPr>
-              <a:t>Awaiting inside a lock is a recipe for producing deadlocks.</a:t>
-            </a:r>
-          </a:p>
-          <a:p>
-            <a:endParaRPr lang="en-US" sz="1200" b="0" i="0" kern="1200" dirty="0">
-              <a:solidFill>
-                <a:schemeClr val="tx1"/>
-              </a:solidFill>
-              <a:effectLst/>
-              <a:latin typeface="+mn-lt"/>
-              <a:ea typeface="+mn-ea"/>
-              <a:cs typeface="+mn-cs"/>
-            </a:endParaRPr>
-          </a:p>
-          <a:p>
-            <a:r>
-              <a:rPr lang="en-US" sz="1200" b="0" i="0" kern="1200" dirty="0">
-                <a:solidFill>
-                  <a:schemeClr val="tx1"/>
-                </a:solidFill>
-                <a:effectLst/>
-                <a:latin typeface="+mn-lt"/>
-                <a:ea typeface="+mn-ea"/>
-                <a:cs typeface="+mn-cs"/>
-              </a:rPr>
-              <a:t>I'm sure you can see why: </a:t>
-            </a:r>
-            <a:r>
-              <a:rPr lang="en-US" sz="1200" b="0" i="1" kern="1200" dirty="0">
-                <a:solidFill>
-                  <a:schemeClr val="tx1"/>
-                </a:solidFill>
-                <a:effectLst/>
-                <a:latin typeface="+mn-lt"/>
-                <a:ea typeface="+mn-ea"/>
-                <a:cs typeface="+mn-cs"/>
-              </a:rPr>
-              <a:t>arbitrary code runs between the time the await returns control to the caller and the method resumes</a:t>
-            </a:r>
-            <a:r>
-              <a:rPr lang="en-US" sz="1200" b="0" i="0" kern="1200" dirty="0">
-                <a:solidFill>
-                  <a:schemeClr val="tx1"/>
-                </a:solidFill>
-                <a:effectLst/>
-                <a:latin typeface="+mn-lt"/>
-                <a:ea typeface="+mn-ea"/>
-                <a:cs typeface="+mn-cs"/>
-              </a:rPr>
-              <a:t>. That arbitrary code could be taking out locks that produce lock ordering inversions, and therefore deadlocks.</a:t>
-            </a:r>
-          </a:p>
-          <a:p>
-            <a:r>
-              <a:rPr lang="en-US" sz="1200" b="0" i="0" kern="1200" dirty="0">
-                <a:solidFill>
-                  <a:schemeClr val="tx1"/>
-                </a:solidFill>
-                <a:effectLst/>
-                <a:latin typeface="+mn-lt"/>
-                <a:ea typeface="+mn-ea"/>
-                <a:cs typeface="+mn-cs"/>
-              </a:rPr>
-              <a:t>Worse, </a:t>
-            </a:r>
-            <a:r>
-              <a:rPr lang="en-US" sz="1200" b="0" i="1" kern="1200" dirty="0">
-                <a:solidFill>
-                  <a:schemeClr val="tx1"/>
-                </a:solidFill>
-                <a:effectLst/>
-                <a:latin typeface="+mn-lt"/>
-                <a:ea typeface="+mn-ea"/>
-                <a:cs typeface="+mn-cs"/>
-              </a:rPr>
-              <a:t>the code could resume on another thread</a:t>
-            </a:r>
-            <a:r>
-              <a:rPr lang="en-US" sz="1200" b="0" i="0" kern="1200" dirty="0">
-                <a:solidFill>
-                  <a:schemeClr val="tx1"/>
-                </a:solidFill>
-                <a:effectLst/>
-                <a:latin typeface="+mn-lt"/>
-                <a:ea typeface="+mn-ea"/>
-                <a:cs typeface="+mn-cs"/>
-              </a:rPr>
-              <a:t> (in advanced scenarios; normally you pick up again on the thread that did the await, but not necessarily) in which case the unlock would be unlocking a lock on a different thread than the thread that took out the lock.</a:t>
-            </a:r>
-          </a:p>
-          <a:p>
             <a:endParaRPr lang="de-CH" dirty="0"/>
           </a:p>
         </p:txBody>
@@ -21909,7 +21833,7 @@
     </p:spTree>
     <p:extLst>
       <p:ext uri="{BB962C8B-B14F-4D97-AF65-F5344CB8AC3E}">
-        <p14:creationId xmlns:p14="http://schemas.microsoft.com/office/powerpoint/2010/main" val="3092264235"/>
+        <p14:creationId xmlns:p14="http://schemas.microsoft.com/office/powerpoint/2010/main" val="2555691090"/>
       </p:ext>
     </p:extLst>
   </p:cSld>
@@ -21963,6 +21887,107 @@
           <a:bodyPr/>
           <a:lstStyle/>
           <a:p>
+            <a:r>
+              <a:rPr lang="en-US" sz="1200" b="0" i="1" kern="1200" dirty="0">
+                <a:solidFill>
+                  <a:schemeClr val="tx1"/>
+                </a:solidFill>
+                <a:effectLst/>
+                <a:latin typeface="+mn-lt"/>
+                <a:ea typeface="+mn-ea"/>
+                <a:cs typeface="+mn-cs"/>
+              </a:rPr>
+              <a:t>Awaiting inside a lock is a recipe for producing deadlocks.</a:t>
+            </a:r>
+          </a:p>
+          <a:p>
+            <a:endParaRPr lang="en-US" sz="1200" b="0" i="0" kern="1200" dirty="0">
+              <a:solidFill>
+                <a:schemeClr val="tx1"/>
+              </a:solidFill>
+              <a:effectLst/>
+              <a:latin typeface="+mn-lt"/>
+              <a:ea typeface="+mn-ea"/>
+              <a:cs typeface="+mn-cs"/>
+            </a:endParaRPr>
+          </a:p>
+          <a:p>
+            <a:r>
+              <a:rPr lang="en-US" sz="1200" b="0" i="0" kern="1200" dirty="0">
+                <a:solidFill>
+                  <a:schemeClr val="tx1"/>
+                </a:solidFill>
+                <a:effectLst/>
+                <a:latin typeface="+mn-lt"/>
+                <a:ea typeface="+mn-ea"/>
+                <a:cs typeface="+mn-cs"/>
+              </a:rPr>
+              <a:t>I'm sure you can see why: </a:t>
+            </a:r>
+            <a:r>
+              <a:rPr lang="en-US" sz="1200" b="0" i="1" kern="1200" dirty="0">
+                <a:solidFill>
+                  <a:schemeClr val="tx1"/>
+                </a:solidFill>
+                <a:effectLst/>
+                <a:latin typeface="+mn-lt"/>
+                <a:ea typeface="+mn-ea"/>
+                <a:cs typeface="+mn-cs"/>
+              </a:rPr>
+              <a:t>arbitrary code runs between the time the await returns control to the caller and the method resumes</a:t>
+            </a:r>
+            <a:r>
+              <a:rPr lang="en-US" sz="1200" b="0" i="0" kern="1200" dirty="0">
+                <a:solidFill>
+                  <a:schemeClr val="tx1"/>
+                </a:solidFill>
+                <a:effectLst/>
+                <a:latin typeface="+mn-lt"/>
+                <a:ea typeface="+mn-ea"/>
+                <a:cs typeface="+mn-cs"/>
+              </a:rPr>
+              <a:t>. That arbitrary code could be taking out locks that produce lock ordering inversions, and therefore deadlocks.</a:t>
+            </a:r>
+          </a:p>
+          <a:p>
+            <a:r>
+              <a:rPr lang="en-US" sz="1200" b="0" i="0" kern="1200" dirty="0">
+                <a:solidFill>
+                  <a:schemeClr val="tx1"/>
+                </a:solidFill>
+                <a:effectLst/>
+                <a:latin typeface="+mn-lt"/>
+                <a:ea typeface="+mn-ea"/>
+                <a:cs typeface="+mn-cs"/>
+              </a:rPr>
+              <a:t>Worse, </a:t>
+            </a:r>
+            <a:r>
+              <a:rPr lang="en-US" sz="1200" b="0" i="1" kern="1200" dirty="0">
+                <a:solidFill>
+                  <a:schemeClr val="tx1"/>
+                </a:solidFill>
+                <a:effectLst/>
+                <a:latin typeface="+mn-lt"/>
+                <a:ea typeface="+mn-ea"/>
+                <a:cs typeface="+mn-cs"/>
+              </a:rPr>
+              <a:t>the code could resume on another thread</a:t>
+            </a:r>
+            <a:r>
+              <a:rPr lang="en-US" sz="1200" b="0" i="0" kern="1200" dirty="0">
+                <a:solidFill>
+                  <a:schemeClr val="tx1"/>
+                </a:solidFill>
+                <a:effectLst/>
+                <a:latin typeface="+mn-lt"/>
+                <a:ea typeface="+mn-ea"/>
+                <a:cs typeface="+mn-cs"/>
+              </a:rPr>
+              <a:t> (in advanced scenarios; normally you pick up again on the thread that did the await, but not necessarily) in which case the unlock would be unlocking a lock on a different thread than the thread that took out the lock.</a:t>
+            </a:r>
+          </a:p>
+          <a:p>
             <a:endParaRPr lang="de-CH" dirty="0"/>
           </a:p>
         </p:txBody>
@@ -21993,7 +22018,7 @@
     </p:spTree>
     <p:extLst>
       <p:ext uri="{BB962C8B-B14F-4D97-AF65-F5344CB8AC3E}">
-        <p14:creationId xmlns:p14="http://schemas.microsoft.com/office/powerpoint/2010/main" val="2250041731"/>
+        <p14:creationId xmlns:p14="http://schemas.microsoft.com/office/powerpoint/2010/main" val="3092264235"/>
       </p:ext>
     </p:extLst>
   </p:cSld>
@@ -22048,106 +22073,13 @@
           <a:lstStyle/>
           <a:p>
             <a:r>
-              <a:rPr lang="en-US" sz="1200" b="0" i="1" kern="1200" dirty="0">
-                <a:solidFill>
-                  <a:schemeClr val="tx1"/>
-                </a:solidFill>
-                <a:effectLst/>
-                <a:latin typeface="+mn-lt"/>
-                <a:ea typeface="+mn-ea"/>
-                <a:cs typeface="+mn-cs"/>
-              </a:rPr>
-              <a:t>Awaiting inside a lock is a recipe for producing deadlocks.</a:t>
-            </a:r>
-          </a:p>
-          <a:p>
-            <a:endParaRPr lang="en-US" sz="1200" b="0" i="0" kern="1200" dirty="0">
-              <a:solidFill>
-                <a:schemeClr val="tx1"/>
-              </a:solidFill>
-              <a:effectLst/>
-              <a:latin typeface="+mn-lt"/>
-              <a:ea typeface="+mn-ea"/>
-              <a:cs typeface="+mn-cs"/>
-            </a:endParaRPr>
-          </a:p>
-          <a:p>
-            <a:r>
-              <a:rPr lang="en-US" sz="1200" b="0" i="0" kern="1200" dirty="0">
-                <a:solidFill>
-                  <a:schemeClr val="tx1"/>
-                </a:solidFill>
-                <a:effectLst/>
-                <a:latin typeface="+mn-lt"/>
-                <a:ea typeface="+mn-ea"/>
-                <a:cs typeface="+mn-cs"/>
-              </a:rPr>
-              <a:t>I'm sure you can see why: </a:t>
-            </a:r>
-            <a:r>
-              <a:rPr lang="en-US" sz="1200" b="0" i="1" kern="1200" dirty="0">
-                <a:solidFill>
-                  <a:schemeClr val="tx1"/>
-                </a:solidFill>
-                <a:effectLst/>
-                <a:latin typeface="+mn-lt"/>
-                <a:ea typeface="+mn-ea"/>
-                <a:cs typeface="+mn-cs"/>
-              </a:rPr>
-              <a:t>arbitrary code runs between the time the await returns control to the caller and the method resumes</a:t>
-            </a:r>
-            <a:r>
-              <a:rPr lang="en-US" sz="1200" b="0" i="0" kern="1200" dirty="0">
-                <a:solidFill>
-                  <a:schemeClr val="tx1"/>
-                </a:solidFill>
-                <a:effectLst/>
-                <a:latin typeface="+mn-lt"/>
-                <a:ea typeface="+mn-ea"/>
-                <a:cs typeface="+mn-cs"/>
-              </a:rPr>
-              <a:t>. That arbitrary code could be taking out locks that produce lock ordering inversions, and therefore deadlocks.</a:t>
-            </a:r>
-          </a:p>
-          <a:p>
-            <a:r>
-              <a:rPr lang="en-US" sz="1200" b="0" i="0" kern="1200" dirty="0">
-                <a:solidFill>
-                  <a:schemeClr val="tx1"/>
-                </a:solidFill>
-                <a:effectLst/>
-                <a:latin typeface="+mn-lt"/>
-                <a:ea typeface="+mn-ea"/>
-                <a:cs typeface="+mn-cs"/>
-              </a:rPr>
-              <a:t>Worse, </a:t>
-            </a:r>
-            <a:r>
-              <a:rPr lang="en-US" sz="1200" b="0" i="1" kern="1200" dirty="0">
-                <a:solidFill>
-                  <a:schemeClr val="tx1"/>
-                </a:solidFill>
-                <a:effectLst/>
-                <a:latin typeface="+mn-lt"/>
-                <a:ea typeface="+mn-ea"/>
-                <a:cs typeface="+mn-cs"/>
-              </a:rPr>
-              <a:t>the code could resume on another thread</a:t>
-            </a:r>
-            <a:r>
-              <a:rPr lang="en-US" sz="1200" b="0" i="0" kern="1200" dirty="0">
-                <a:solidFill>
-                  <a:schemeClr val="tx1"/>
-                </a:solidFill>
-                <a:effectLst/>
-                <a:latin typeface="+mn-lt"/>
-                <a:ea typeface="+mn-ea"/>
-                <a:cs typeface="+mn-cs"/>
-              </a:rPr>
-              <a:t> (in advanced scenarios; normally you pick up again on the thread that did the await, but not necessarily) in which case the unlock would be unlocking a lock on a different thread than the thread that took out the lock.</a:t>
-            </a:r>
-          </a:p>
-          <a:p>
+              <a:rPr lang="en-US" dirty="0"/>
+              <a:t>Use another</a:t>
+            </a:r>
+            <a:r>
+              <a:rPr lang="en-US" baseline="0" dirty="0"/>
+              <a:t> icon</a:t>
+            </a:r>
             <a:endParaRPr lang="de-CH" dirty="0"/>
           </a:p>
         </p:txBody>
@@ -22178,7 +22110,7 @@
     </p:spTree>
     <p:extLst>
       <p:ext uri="{BB962C8B-B14F-4D97-AF65-F5344CB8AC3E}">
-        <p14:creationId xmlns:p14="http://schemas.microsoft.com/office/powerpoint/2010/main" val="837369978"/>
+        <p14:creationId xmlns:p14="http://schemas.microsoft.com/office/powerpoint/2010/main" val="2250041731"/>
       </p:ext>
     </p:extLst>
   </p:cSld>
@@ -22352,6 +22284,107 @@
           <a:bodyPr/>
           <a:lstStyle/>
           <a:p>
+            <a:r>
+              <a:rPr lang="en-US" sz="1200" b="0" i="1" kern="1200" dirty="0">
+                <a:solidFill>
+                  <a:schemeClr val="tx1"/>
+                </a:solidFill>
+                <a:effectLst/>
+                <a:latin typeface="+mn-lt"/>
+                <a:ea typeface="+mn-ea"/>
+                <a:cs typeface="+mn-cs"/>
+              </a:rPr>
+              <a:t>Awaiting inside a lock is a recipe for producing deadlocks.</a:t>
+            </a:r>
+          </a:p>
+          <a:p>
+            <a:endParaRPr lang="en-US" sz="1200" b="0" i="0" kern="1200" dirty="0">
+              <a:solidFill>
+                <a:schemeClr val="tx1"/>
+              </a:solidFill>
+              <a:effectLst/>
+              <a:latin typeface="+mn-lt"/>
+              <a:ea typeface="+mn-ea"/>
+              <a:cs typeface="+mn-cs"/>
+            </a:endParaRPr>
+          </a:p>
+          <a:p>
+            <a:r>
+              <a:rPr lang="en-US" sz="1200" b="0" i="0" kern="1200" dirty="0">
+                <a:solidFill>
+                  <a:schemeClr val="tx1"/>
+                </a:solidFill>
+                <a:effectLst/>
+                <a:latin typeface="+mn-lt"/>
+                <a:ea typeface="+mn-ea"/>
+                <a:cs typeface="+mn-cs"/>
+              </a:rPr>
+              <a:t>I'm sure you can see why: </a:t>
+            </a:r>
+            <a:r>
+              <a:rPr lang="en-US" sz="1200" b="0" i="1" kern="1200" dirty="0">
+                <a:solidFill>
+                  <a:schemeClr val="tx1"/>
+                </a:solidFill>
+                <a:effectLst/>
+                <a:latin typeface="+mn-lt"/>
+                <a:ea typeface="+mn-ea"/>
+                <a:cs typeface="+mn-cs"/>
+              </a:rPr>
+              <a:t>arbitrary code runs between the time the await returns control to the caller and the method resumes</a:t>
+            </a:r>
+            <a:r>
+              <a:rPr lang="en-US" sz="1200" b="0" i="0" kern="1200" dirty="0">
+                <a:solidFill>
+                  <a:schemeClr val="tx1"/>
+                </a:solidFill>
+                <a:effectLst/>
+                <a:latin typeface="+mn-lt"/>
+                <a:ea typeface="+mn-ea"/>
+                <a:cs typeface="+mn-cs"/>
+              </a:rPr>
+              <a:t>. That arbitrary code could be taking out locks that produce lock ordering inversions, and therefore deadlocks.</a:t>
+            </a:r>
+          </a:p>
+          <a:p>
+            <a:r>
+              <a:rPr lang="en-US" sz="1200" b="0" i="0" kern="1200" dirty="0">
+                <a:solidFill>
+                  <a:schemeClr val="tx1"/>
+                </a:solidFill>
+                <a:effectLst/>
+                <a:latin typeface="+mn-lt"/>
+                <a:ea typeface="+mn-ea"/>
+                <a:cs typeface="+mn-cs"/>
+              </a:rPr>
+              <a:t>Worse, </a:t>
+            </a:r>
+            <a:r>
+              <a:rPr lang="en-US" sz="1200" b="0" i="1" kern="1200" dirty="0">
+                <a:solidFill>
+                  <a:schemeClr val="tx1"/>
+                </a:solidFill>
+                <a:effectLst/>
+                <a:latin typeface="+mn-lt"/>
+                <a:ea typeface="+mn-ea"/>
+                <a:cs typeface="+mn-cs"/>
+              </a:rPr>
+              <a:t>the code could resume on another thread</a:t>
+            </a:r>
+            <a:r>
+              <a:rPr lang="en-US" sz="1200" b="0" i="0" kern="1200" dirty="0">
+                <a:solidFill>
+                  <a:schemeClr val="tx1"/>
+                </a:solidFill>
+                <a:effectLst/>
+                <a:latin typeface="+mn-lt"/>
+                <a:ea typeface="+mn-ea"/>
+                <a:cs typeface="+mn-cs"/>
+              </a:rPr>
+              <a:t> (in advanced scenarios; normally you pick up again on the thread that did the await, but not necessarily) in which case the unlock would be unlocking a lock on a different thread than the thread that took out the lock.</a:t>
+            </a:r>
+          </a:p>
+          <a:p>
             <a:endParaRPr lang="de-CH" dirty="0"/>
           </a:p>
         </p:txBody>
@@ -22382,7 +22415,7 @@
     </p:spTree>
     <p:extLst>
       <p:ext uri="{BB962C8B-B14F-4D97-AF65-F5344CB8AC3E}">
-        <p14:creationId xmlns:p14="http://schemas.microsoft.com/office/powerpoint/2010/main" val="288405713"/>
+        <p14:creationId xmlns:p14="http://schemas.microsoft.com/office/powerpoint/2010/main" val="837369978"/>
       </p:ext>
     </p:extLst>
   </p:cSld>
@@ -22436,10 +22469,6 @@
           <a:bodyPr/>
           <a:lstStyle/>
           <a:p>
-            <a:r>
-              <a:rPr lang="en-US" dirty="0"/>
-              <a:t>Maybe add RPC??</a:t>
-            </a:r>
             <a:endParaRPr lang="de-CH" dirty="0"/>
           </a:p>
         </p:txBody>
@@ -22470,7 +22499,7 @@
     </p:spTree>
     <p:extLst>
       <p:ext uri="{BB962C8B-B14F-4D97-AF65-F5344CB8AC3E}">
-        <p14:creationId xmlns:p14="http://schemas.microsoft.com/office/powerpoint/2010/main" val="4050176330"/>
+        <p14:creationId xmlns:p14="http://schemas.microsoft.com/office/powerpoint/2010/main" val="288405713"/>
       </p:ext>
     </p:extLst>
   </p:cSld>
@@ -22526,7 +22555,11 @@
           <a:p>
             <a:r>
               <a:rPr lang="en-US" dirty="0"/>
-              <a:t>Maybe add RPC??</a:t>
+              <a:t>Maybe just refer to my blog</a:t>
+            </a:r>
+            <a:r>
+              <a:rPr lang="en-US" baseline="0" dirty="0"/>
+              <a:t> post</a:t>
             </a:r>
             <a:endParaRPr lang="de-CH" dirty="0"/>
           </a:p>
@@ -22558,7 +22591,7 @@
     </p:spTree>
     <p:extLst>
       <p:ext uri="{BB962C8B-B14F-4D97-AF65-F5344CB8AC3E}">
-        <p14:creationId xmlns:p14="http://schemas.microsoft.com/office/powerpoint/2010/main" val="1592288050"/>
+        <p14:creationId xmlns:p14="http://schemas.microsoft.com/office/powerpoint/2010/main" val="4050176330"/>
       </p:ext>
     </p:extLst>
   </p:cSld>
@@ -22612,6 +22645,10 @@
           <a:bodyPr/>
           <a:lstStyle/>
           <a:p>
+            <a:r>
+              <a:rPr lang="en-US" dirty="0"/>
+              <a:t>Maybe add RPC??</a:t>
+            </a:r>
             <a:endParaRPr lang="de-CH" dirty="0"/>
           </a:p>
         </p:txBody>
@@ -22642,7 +22679,7 @@
     </p:spTree>
     <p:extLst>
       <p:ext uri="{BB962C8B-B14F-4D97-AF65-F5344CB8AC3E}">
-        <p14:creationId xmlns:p14="http://schemas.microsoft.com/office/powerpoint/2010/main" val="1927449786"/>
+        <p14:creationId xmlns:p14="http://schemas.microsoft.com/office/powerpoint/2010/main" val="1592288050"/>
       </p:ext>
     </p:extLst>
   </p:cSld>
@@ -22696,14 +22733,35 @@
           <a:bodyPr/>
           <a:lstStyle/>
           <a:p>
+            <a:pPr marL="0" marR="0" indent="0" algn="l" defTabSz="914400" rtl="0" eaLnBrk="1" fontAlgn="auto" latinLnBrk="0" hangingPunct="1">
+              <a:lnSpc>
+                <a:spcPct val="100000"/>
+              </a:lnSpc>
+              <a:spcBef>
+                <a:spcPts val="0"/>
+              </a:spcBef>
+              <a:spcAft>
+                <a:spcPts val="0"/>
+              </a:spcAft>
+              <a:buClrTx/>
+              <a:buSzTx/>
+              <a:buFontTx/>
+              <a:buNone/>
+              <a:tabLst/>
+              <a:defRPr/>
+            </a:pPr>
             <a:r>
               <a:rPr lang="en-US" dirty="0"/>
-              <a:t>Stop thinking in threads. For</a:t>
+              <a:t>Use another</a:t>
             </a:r>
             <a:r>
               <a:rPr lang="en-US" baseline="0" dirty="0"/>
-              <a:t> most applications threads are no longer relevant. Think in Tasks. Rest assured the TPL runtime is heavily optimized for most production scenarios.</a:t>
-            </a:r>
+              <a:t> icon</a:t>
+            </a:r>
+            <a:endParaRPr lang="de-CH" dirty="0"/>
+          </a:p>
+          <a:p>
+            <a:endParaRPr lang="de-CH" dirty="0"/>
           </a:p>
         </p:txBody>
       </p:sp>
@@ -22733,7 +22791,7 @@
     </p:spTree>
     <p:extLst>
       <p:ext uri="{BB962C8B-B14F-4D97-AF65-F5344CB8AC3E}">
-        <p14:creationId xmlns:p14="http://schemas.microsoft.com/office/powerpoint/2010/main" val="2663047027"/>
+        <p14:creationId xmlns:p14="http://schemas.microsoft.com/office/powerpoint/2010/main" val="1927449786"/>
       </p:ext>
     </p:extLst>
   </p:cSld>
@@ -22789,63 +22847,12 @@
           <a:p>
             <a:r>
               <a:rPr lang="en-US" dirty="0"/>
-              <a:t>I show you a four-phased approach to evolving your code-base towards </a:t>
-            </a:r>
-            <a:r>
-              <a:rPr lang="en-US" dirty="0" err="1"/>
-              <a:t>async</a:t>
-            </a:r>
-            <a:r>
-              <a:rPr lang="en-US" dirty="0"/>
-              <a:t>/wait. In the identification phase, we classify the components which would benefit from </a:t>
-            </a:r>
-            <a:r>
-              <a:rPr lang="en-US" dirty="0" err="1"/>
-              <a:t>async</a:t>
-            </a:r>
-            <a:r>
-              <a:rPr lang="en-US" dirty="0"/>
-              <a:t>/await. In the exploration phase, we discover potential road blockers which might hinder the </a:t>
-            </a:r>
-            <a:r>
-              <a:rPr lang="en-US" dirty="0" err="1"/>
-              <a:t>async</a:t>
-            </a:r>
-            <a:r>
-              <a:rPr lang="en-US" dirty="0"/>
-              <a:t>/await adoption.</a:t>
-            </a:r>
-          </a:p>
-          <a:p>
-            <a:endParaRPr lang="en-US" dirty="0"/>
-          </a:p>
-          <a:p>
-            <a:r>
-              <a:rPr lang="en-US" dirty="0"/>
-              <a:t>In the obstacle phase, we learn to redesign parts of the code to remove the previously identified road blockers. In the bring-it-together phase, we gradually move the components which benefit the most from </a:t>
-            </a:r>
-            <a:r>
-              <a:rPr lang="en-US" dirty="0" err="1"/>
-              <a:t>async</a:t>
-            </a:r>
-            <a:r>
-              <a:rPr lang="en-US" dirty="0"/>
-              <a:t>/await to a full asynchronous API. Small steps. No Big Bang.</a:t>
-            </a:r>
-          </a:p>
-          <a:p>
-            <a:endParaRPr lang="en-US" dirty="0"/>
-          </a:p>
-          <a:p>
-            <a:r>
-              <a:rPr lang="en-US" dirty="0"/>
-              <a:t>Make a word</a:t>
+              <a:t>Stop thinking in threads. For</a:t>
             </a:r>
             <a:r>
               <a:rPr lang="en-US" baseline="0" dirty="0"/>
-              <a:t> out of it</a:t>
-            </a:r>
-            <a:endParaRPr lang="de-CH" dirty="0"/>
+              <a:t> most applications threads are no longer relevant. Think in Tasks. Rest assured the TPL runtime is heavily optimized for most production scenarios.</a:t>
+            </a:r>
           </a:p>
         </p:txBody>
       </p:sp>
@@ -22875,7 +22882,7 @@
     </p:spTree>
     <p:extLst>
       <p:ext uri="{BB962C8B-B14F-4D97-AF65-F5344CB8AC3E}">
-        <p14:creationId xmlns:p14="http://schemas.microsoft.com/office/powerpoint/2010/main" val="4275730487"/>
+        <p14:creationId xmlns:p14="http://schemas.microsoft.com/office/powerpoint/2010/main" val="2663047027"/>
       </p:ext>
     </p:extLst>
   </p:cSld>
@@ -22929,6 +22936,64 @@
           <a:bodyPr/>
           <a:lstStyle/>
           <a:p>
+            <a:r>
+              <a:rPr lang="en-US" dirty="0"/>
+              <a:t>I show you a four-phased approach to evolving your code-base towards </a:t>
+            </a:r>
+            <a:r>
+              <a:rPr lang="en-US" dirty="0" err="1"/>
+              <a:t>async</a:t>
+            </a:r>
+            <a:r>
+              <a:rPr lang="en-US" dirty="0"/>
+              <a:t>/wait. In the identification phase, we classify the components which would benefit from </a:t>
+            </a:r>
+            <a:r>
+              <a:rPr lang="en-US" dirty="0" err="1"/>
+              <a:t>async</a:t>
+            </a:r>
+            <a:r>
+              <a:rPr lang="en-US" dirty="0"/>
+              <a:t>/await. In the exploration phase, we discover potential road blockers which might hinder the </a:t>
+            </a:r>
+            <a:r>
+              <a:rPr lang="en-US" dirty="0" err="1"/>
+              <a:t>async</a:t>
+            </a:r>
+            <a:r>
+              <a:rPr lang="en-US" dirty="0"/>
+              <a:t>/await adoption.</a:t>
+            </a:r>
+          </a:p>
+          <a:p>
+            <a:endParaRPr lang="en-US" dirty="0"/>
+          </a:p>
+          <a:p>
+            <a:r>
+              <a:rPr lang="en-US" dirty="0"/>
+              <a:t>In the obstacle phase, we learn to redesign parts of the code to remove the previously identified road blockers. In the bring-it-together phase, we gradually move the components which benefit the most from </a:t>
+            </a:r>
+            <a:r>
+              <a:rPr lang="en-US" dirty="0" err="1"/>
+              <a:t>async</a:t>
+            </a:r>
+            <a:r>
+              <a:rPr lang="en-US" dirty="0"/>
+              <a:t>/await to a full asynchronous API. Small steps. No Big Bang.</a:t>
+            </a:r>
+          </a:p>
+          <a:p>
+            <a:endParaRPr lang="en-US" dirty="0"/>
+          </a:p>
+          <a:p>
+            <a:r>
+              <a:rPr lang="en-US" dirty="0"/>
+              <a:t>Make a word</a:t>
+            </a:r>
+            <a:r>
+              <a:rPr lang="en-US" baseline="0" dirty="0"/>
+              <a:t> out of it</a:t>
+            </a:r>
             <a:endParaRPr lang="de-CH" dirty="0"/>
           </a:p>
         </p:txBody>
@@ -22959,7 +23024,7 @@
     </p:spTree>
     <p:extLst>
       <p:ext uri="{BB962C8B-B14F-4D97-AF65-F5344CB8AC3E}">
-        <p14:creationId xmlns:p14="http://schemas.microsoft.com/office/powerpoint/2010/main" val="3079499084"/>
+        <p14:creationId xmlns:p14="http://schemas.microsoft.com/office/powerpoint/2010/main" val="4275730487"/>
       </p:ext>
     </p:extLst>
   </p:cSld>
@@ -23043,7 +23108,7 @@
     </p:spTree>
     <p:extLst>
       <p:ext uri="{BB962C8B-B14F-4D97-AF65-F5344CB8AC3E}">
-        <p14:creationId xmlns:p14="http://schemas.microsoft.com/office/powerpoint/2010/main" val="1579215875"/>
+        <p14:creationId xmlns:p14="http://schemas.microsoft.com/office/powerpoint/2010/main" val="3079499084"/>
       </p:ext>
     </p:extLst>
   </p:cSld>
@@ -23127,7 +23192,7 @@
     </p:spTree>
     <p:extLst>
       <p:ext uri="{BB962C8B-B14F-4D97-AF65-F5344CB8AC3E}">
-        <p14:creationId xmlns:p14="http://schemas.microsoft.com/office/powerpoint/2010/main" val="1588688443"/>
+        <p14:creationId xmlns:p14="http://schemas.microsoft.com/office/powerpoint/2010/main" val="1579215875"/>
       </p:ext>
     </p:extLst>
   </p:cSld>
@@ -23211,7 +23276,7 @@
     </p:spTree>
     <p:extLst>
       <p:ext uri="{BB962C8B-B14F-4D97-AF65-F5344CB8AC3E}">
-        <p14:creationId xmlns:p14="http://schemas.microsoft.com/office/powerpoint/2010/main" val="1228215780"/>
+        <p14:creationId xmlns:p14="http://schemas.microsoft.com/office/powerpoint/2010/main" val="1588688443"/>
       </p:ext>
     </p:extLst>
   </p:cSld>
@@ -23606,7 +23671,7 @@
     </p:spTree>
     <p:extLst>
       <p:ext uri="{BB962C8B-B14F-4D97-AF65-F5344CB8AC3E}">
-        <p14:creationId xmlns:p14="http://schemas.microsoft.com/office/powerpoint/2010/main" val="3569975160"/>
+        <p14:creationId xmlns:p14="http://schemas.microsoft.com/office/powerpoint/2010/main" val="1228215780"/>
       </p:ext>
     </p:extLst>
   </p:cSld>
@@ -23690,7 +23755,7 @@
     </p:spTree>
     <p:extLst>
       <p:ext uri="{BB962C8B-B14F-4D97-AF65-F5344CB8AC3E}">
-        <p14:creationId xmlns:p14="http://schemas.microsoft.com/office/powerpoint/2010/main" val="1956186479"/>
+        <p14:creationId xmlns:p14="http://schemas.microsoft.com/office/powerpoint/2010/main" val="3569975160"/>
       </p:ext>
     </p:extLst>
   </p:cSld>
@@ -23744,10 +23809,6 @@
           <a:bodyPr/>
           <a:lstStyle/>
           <a:p>
-            <a:r>
-              <a:rPr lang="en-US" dirty="0"/>
-              <a:t>Maybe add RPC??</a:t>
-            </a:r>
             <a:endParaRPr lang="de-CH" dirty="0"/>
           </a:p>
         </p:txBody>
@@ -23778,7 +23839,7 @@
     </p:spTree>
     <p:extLst>
       <p:ext uri="{BB962C8B-B14F-4D97-AF65-F5344CB8AC3E}">
-        <p14:creationId xmlns:p14="http://schemas.microsoft.com/office/powerpoint/2010/main" val="4060569646"/>
+        <p14:creationId xmlns:p14="http://schemas.microsoft.com/office/powerpoint/2010/main" val="1956186479"/>
       </p:ext>
     </p:extLst>
   </p:cSld>
@@ -23866,7 +23927,7 @@
     </p:spTree>
     <p:extLst>
       <p:ext uri="{BB962C8B-B14F-4D97-AF65-F5344CB8AC3E}">
-        <p14:creationId xmlns:p14="http://schemas.microsoft.com/office/powerpoint/2010/main" val="128107605"/>
+        <p14:creationId xmlns:p14="http://schemas.microsoft.com/office/powerpoint/2010/main" val="4060569646"/>
       </p:ext>
     </p:extLst>
   </p:cSld>
@@ -23954,7 +24015,7 @@
     </p:spTree>
     <p:extLst>
       <p:ext uri="{BB962C8B-B14F-4D97-AF65-F5344CB8AC3E}">
-        <p14:creationId xmlns:p14="http://schemas.microsoft.com/office/powerpoint/2010/main" val="1371806687"/>
+        <p14:creationId xmlns:p14="http://schemas.microsoft.com/office/powerpoint/2010/main" val="128107605"/>
       </p:ext>
     </p:extLst>
   </p:cSld>
@@ -24008,6 +24069,19 @@
           <a:bodyPr/>
           <a:lstStyle/>
           <a:p>
+            <a:r>
+              <a:rPr lang="en-US" dirty="0"/>
+              <a:t>Maybe add RPC??</a:t>
+            </a:r>
+          </a:p>
+          <a:p>
+            <a:endParaRPr lang="en-US" dirty="0"/>
+          </a:p>
+          <a:p>
+            <a:r>
+              <a:rPr lang="en-US" dirty="0"/>
+              <a:t>Show output?</a:t>
+            </a:r>
             <a:endParaRPr lang="de-CH" dirty="0"/>
           </a:p>
         </p:txBody>
@@ -24038,7 +24112,7 @@
     </p:spTree>
     <p:extLst>
       <p:ext uri="{BB962C8B-B14F-4D97-AF65-F5344CB8AC3E}">
-        <p14:creationId xmlns:p14="http://schemas.microsoft.com/office/powerpoint/2010/main" val="685339004"/>
+        <p14:creationId xmlns:p14="http://schemas.microsoft.com/office/powerpoint/2010/main" val="1371806687"/>
       </p:ext>
     </p:extLst>
   </p:cSld>
@@ -24113,7 +24187,7 @@
           <a:p>
             <a:fld id="{9BCA07FD-5BD5-4529-84B0-48DD2C561176}" type="slidenum">
               <a:rPr lang="de-CH" smtClean="0"/>
-              <a:t>53</a:t>
+              <a:t>49</a:t>
             </a:fld>
             <a:endParaRPr lang="de-CH"/>
           </a:p>
@@ -24122,7 +24196,7 @@
     </p:spTree>
     <p:extLst>
       <p:ext uri="{BB962C8B-B14F-4D97-AF65-F5344CB8AC3E}">
-        <p14:creationId xmlns:p14="http://schemas.microsoft.com/office/powerpoint/2010/main" val="1285901199"/>
+        <p14:creationId xmlns:p14="http://schemas.microsoft.com/office/powerpoint/2010/main" val="685339004"/>
       </p:ext>
     </p:extLst>
   </p:cSld>
@@ -24197,7 +24271,7 @@
           <a:p>
             <a:fld id="{9BCA07FD-5BD5-4529-84B0-48DD2C561176}" type="slidenum">
               <a:rPr lang="de-CH" smtClean="0"/>
-              <a:t>55</a:t>
+              <a:t>52</a:t>
             </a:fld>
             <a:endParaRPr lang="de-CH"/>
           </a:p>
@@ -24206,7 +24280,7 @@
     </p:spTree>
     <p:extLst>
       <p:ext uri="{BB962C8B-B14F-4D97-AF65-F5344CB8AC3E}">
-        <p14:creationId xmlns:p14="http://schemas.microsoft.com/office/powerpoint/2010/main" val="1928972092"/>
+        <p14:creationId xmlns:p14="http://schemas.microsoft.com/office/powerpoint/2010/main" val="982283487"/>
       </p:ext>
     </p:extLst>
   </p:cSld>
@@ -24281,7 +24355,7 @@
           <a:p>
             <a:fld id="{9BCA07FD-5BD5-4529-84B0-48DD2C561176}" type="slidenum">
               <a:rPr lang="de-CH" smtClean="0"/>
-              <a:t>57</a:t>
+              <a:t>53</a:t>
             </a:fld>
             <a:endParaRPr lang="de-CH"/>
           </a:p>
@@ -24290,7 +24364,7 @@
     </p:spTree>
     <p:extLst>
       <p:ext uri="{BB962C8B-B14F-4D97-AF65-F5344CB8AC3E}">
-        <p14:creationId xmlns:p14="http://schemas.microsoft.com/office/powerpoint/2010/main" val="3949617383"/>
+        <p14:creationId xmlns:p14="http://schemas.microsoft.com/office/powerpoint/2010/main" val="1285901199"/>
       </p:ext>
     </p:extLst>
   </p:cSld>
@@ -24344,30 +24418,6 @@
           <a:bodyPr/>
           <a:lstStyle/>
           <a:p>
-            <a:pPr marL="0" marR="0" indent="0" algn="l" defTabSz="914400" rtl="0" eaLnBrk="1" fontAlgn="auto" latinLnBrk="0" hangingPunct="1">
-              <a:lnSpc>
-                <a:spcPct val="100000"/>
-              </a:lnSpc>
-              <a:spcBef>
-                <a:spcPts val="0"/>
-              </a:spcBef>
-              <a:spcAft>
-                <a:spcPts val="0"/>
-              </a:spcAft>
-              <a:buClrTx/>
-              <a:buSzTx/>
-              <a:buFontTx/>
-              <a:buNone/>
-              <a:tabLst/>
-              <a:defRPr/>
-            </a:pPr>
-            <a:r>
-              <a:rPr lang="en-US" baseline="0" dirty="0"/>
-              <a:t>Before we dive deep into code I’m going to talk important terminologies.</a:t>
-            </a:r>
-            <a:endParaRPr lang="de-CH" dirty="0"/>
-          </a:p>
-          <a:p>
             <a:endParaRPr lang="de-CH" dirty="0"/>
           </a:p>
         </p:txBody>
@@ -24389,7 +24439,7 @@
           <a:p>
             <a:fld id="{9BCA07FD-5BD5-4529-84B0-48DD2C561176}" type="slidenum">
               <a:rPr lang="de-CH" smtClean="0"/>
-              <a:t>58</a:t>
+              <a:t>55</a:t>
             </a:fld>
             <a:endParaRPr lang="de-CH"/>
           </a:p>
@@ -24398,7 +24448,7 @@
     </p:spTree>
     <p:extLst>
       <p:ext uri="{BB962C8B-B14F-4D97-AF65-F5344CB8AC3E}">
-        <p14:creationId xmlns:p14="http://schemas.microsoft.com/office/powerpoint/2010/main" val="4133219354"/>
+        <p14:creationId xmlns:p14="http://schemas.microsoft.com/office/powerpoint/2010/main" val="1928972092"/>
       </p:ext>
     </p:extLst>
   </p:cSld>
@@ -24593,7 +24643,7 @@
           <a:p>
             <a:fld id="{9BCA07FD-5BD5-4529-84B0-48DD2C561176}" type="slidenum">
               <a:rPr lang="de-CH" smtClean="0"/>
-              <a:t>59</a:t>
+              <a:t>57</a:t>
             </a:fld>
             <a:endParaRPr lang="de-CH"/>
           </a:p>
@@ -24602,7 +24652,7 @@
     </p:spTree>
     <p:extLst>
       <p:ext uri="{BB962C8B-B14F-4D97-AF65-F5344CB8AC3E}">
-        <p14:creationId xmlns:p14="http://schemas.microsoft.com/office/powerpoint/2010/main" val="3503916100"/>
+        <p14:creationId xmlns:p14="http://schemas.microsoft.com/office/powerpoint/2010/main" val="3949617383"/>
       </p:ext>
     </p:extLst>
   </p:cSld>
@@ -24656,10 +24706,30 @@
           <a:bodyPr/>
           <a:lstStyle/>
           <a:p>
-            <a:r>
-              <a:rPr lang="en-US" dirty="0"/>
-              <a:t>Questions that can be answered in blog posts</a:t>
-            </a:r>
+            <a:pPr marL="0" marR="0" indent="0" algn="l" defTabSz="914400" rtl="0" eaLnBrk="1" fontAlgn="auto" latinLnBrk="0" hangingPunct="1">
+              <a:lnSpc>
+                <a:spcPct val="100000"/>
+              </a:lnSpc>
+              <a:spcBef>
+                <a:spcPts val="0"/>
+              </a:spcBef>
+              <a:spcAft>
+                <a:spcPts val="0"/>
+              </a:spcAft>
+              <a:buClrTx/>
+              <a:buSzTx/>
+              <a:buFontTx/>
+              <a:buNone/>
+              <a:tabLst/>
+              <a:defRPr/>
+            </a:pPr>
+            <a:r>
+              <a:rPr lang="en-US" baseline="0" dirty="0"/>
+              <a:t>Before we dive deep into code I’m going to talk important terminologies.</a:t>
+            </a:r>
+            <a:endParaRPr lang="de-CH" dirty="0"/>
+          </a:p>
+          <a:p>
             <a:endParaRPr lang="de-CH" dirty="0"/>
           </a:p>
         </p:txBody>
@@ -24681,7 +24751,7 @@
           <a:p>
             <a:fld id="{9BCA07FD-5BD5-4529-84B0-48DD2C561176}" type="slidenum">
               <a:rPr lang="de-CH" smtClean="0"/>
-              <a:t>60</a:t>
+              <a:t>58</a:t>
             </a:fld>
             <a:endParaRPr lang="de-CH"/>
           </a:p>
@@ -24690,7 +24760,7 @@
     </p:spTree>
     <p:extLst>
       <p:ext uri="{BB962C8B-B14F-4D97-AF65-F5344CB8AC3E}">
-        <p14:creationId xmlns:p14="http://schemas.microsoft.com/office/powerpoint/2010/main" val="3670487613"/>
+        <p14:creationId xmlns:p14="http://schemas.microsoft.com/office/powerpoint/2010/main" val="4133219354"/>
       </p:ext>
     </p:extLst>
   </p:cSld>
@@ -24765,6 +24835,178 @@
           <a:p>
             <a:fld id="{9BCA07FD-5BD5-4529-84B0-48DD2C561176}" type="slidenum">
               <a:rPr lang="de-CH" smtClean="0"/>
+              <a:t>59</a:t>
+            </a:fld>
+            <a:endParaRPr lang="de-CH"/>
+          </a:p>
+        </p:txBody>
+      </p:sp>
+    </p:spTree>
+    <p:extLst>
+      <p:ext uri="{BB962C8B-B14F-4D97-AF65-F5344CB8AC3E}">
+        <p14:creationId xmlns:p14="http://schemas.microsoft.com/office/powerpoint/2010/main" val="3503916100"/>
+      </p:ext>
+    </p:extLst>
+  </p:cSld>
+  <p:clrMapOvr>
+    <a:masterClrMapping/>
+  </p:clrMapOvr>
+</p:notes>
+</file>
+
+<file path=ppt/notesSlides/notesSlide53.xml><?xml version="1.0" encoding="utf-8"?>
+<p:notes xmlns:a="http://schemas.openxmlformats.org/drawingml/2006/main" xmlns:r="http://schemas.openxmlformats.org/officeDocument/2006/relationships" xmlns:p="http://schemas.openxmlformats.org/presentationml/2006/main">
+  <p:cSld>
+    <p:spTree>
+      <p:nvGrpSpPr>
+        <p:cNvPr id="1" name=""/>
+        <p:cNvGrpSpPr/>
+        <p:nvPr/>
+      </p:nvGrpSpPr>
+      <p:grpSpPr>
+        <a:xfrm>
+          <a:off x="0" y="0"/>
+          <a:ext cx="0" cy="0"/>
+          <a:chOff x="0" y="0"/>
+          <a:chExt cx="0" cy="0"/>
+        </a:xfrm>
+      </p:grpSpPr>
+      <p:sp>
+        <p:nvSpPr>
+          <p:cNvPr id="2" name="Slide Image Placeholder 1"/>
+          <p:cNvSpPr>
+            <a:spLocks noGrp="1" noRot="1" noChangeAspect="1"/>
+          </p:cNvSpPr>
+          <p:nvPr>
+            <p:ph type="sldImg"/>
+          </p:nvPr>
+        </p:nvSpPr>
+        <p:spPr/>
+      </p:sp>
+      <p:sp>
+        <p:nvSpPr>
+          <p:cNvPr id="3" name="Notes Placeholder 2"/>
+          <p:cNvSpPr>
+            <a:spLocks noGrp="1"/>
+          </p:cNvSpPr>
+          <p:nvPr>
+            <p:ph type="body" idx="1"/>
+          </p:nvPr>
+        </p:nvSpPr>
+        <p:spPr/>
+        <p:txBody>
+          <a:bodyPr/>
+          <a:lstStyle/>
+          <a:p>
+            <a:r>
+              <a:rPr lang="en-US" dirty="0"/>
+              <a:t>Questions that can be answered in blog posts</a:t>
+            </a:r>
+            <a:endParaRPr lang="de-CH" dirty="0"/>
+          </a:p>
+        </p:txBody>
+      </p:sp>
+      <p:sp>
+        <p:nvSpPr>
+          <p:cNvPr id="4" name="Slide Number Placeholder 3"/>
+          <p:cNvSpPr>
+            <a:spLocks noGrp="1"/>
+          </p:cNvSpPr>
+          <p:nvPr>
+            <p:ph type="sldNum" sz="quarter" idx="10"/>
+          </p:nvPr>
+        </p:nvSpPr>
+        <p:spPr/>
+        <p:txBody>
+          <a:bodyPr/>
+          <a:lstStyle/>
+          <a:p>
+            <a:fld id="{9BCA07FD-5BD5-4529-84B0-48DD2C561176}" type="slidenum">
+              <a:rPr lang="de-CH" smtClean="0"/>
+              <a:t>60</a:t>
+            </a:fld>
+            <a:endParaRPr lang="de-CH"/>
+          </a:p>
+        </p:txBody>
+      </p:sp>
+    </p:spTree>
+    <p:extLst>
+      <p:ext uri="{BB962C8B-B14F-4D97-AF65-F5344CB8AC3E}">
+        <p14:creationId xmlns:p14="http://schemas.microsoft.com/office/powerpoint/2010/main" val="3670487613"/>
+      </p:ext>
+    </p:extLst>
+  </p:cSld>
+  <p:clrMapOvr>
+    <a:masterClrMapping/>
+  </p:clrMapOvr>
+</p:notes>
+</file>
+
+<file path=ppt/notesSlides/notesSlide54.xml><?xml version="1.0" encoding="utf-8"?>
+<p:notes xmlns:a="http://schemas.openxmlformats.org/drawingml/2006/main" xmlns:r="http://schemas.openxmlformats.org/officeDocument/2006/relationships" xmlns:p="http://schemas.openxmlformats.org/presentationml/2006/main">
+  <p:cSld>
+    <p:spTree>
+      <p:nvGrpSpPr>
+        <p:cNvPr id="1" name=""/>
+        <p:cNvGrpSpPr/>
+        <p:nvPr/>
+      </p:nvGrpSpPr>
+      <p:grpSpPr>
+        <a:xfrm>
+          <a:off x="0" y="0"/>
+          <a:ext cx="0" cy="0"/>
+          <a:chOff x="0" y="0"/>
+          <a:chExt cx="0" cy="0"/>
+        </a:xfrm>
+      </p:grpSpPr>
+      <p:sp>
+        <p:nvSpPr>
+          <p:cNvPr id="2" name="Slide Image Placeholder 1"/>
+          <p:cNvSpPr>
+            <a:spLocks noGrp="1" noRot="1" noChangeAspect="1"/>
+          </p:cNvSpPr>
+          <p:nvPr>
+            <p:ph type="sldImg"/>
+          </p:nvPr>
+        </p:nvSpPr>
+        <p:spPr/>
+      </p:sp>
+      <p:sp>
+        <p:nvSpPr>
+          <p:cNvPr id="3" name="Notes Placeholder 2"/>
+          <p:cNvSpPr>
+            <a:spLocks noGrp="1"/>
+          </p:cNvSpPr>
+          <p:nvPr>
+            <p:ph type="body" idx="1"/>
+          </p:nvPr>
+        </p:nvSpPr>
+        <p:spPr/>
+        <p:txBody>
+          <a:bodyPr/>
+          <a:lstStyle/>
+          <a:p>
+            <a:endParaRPr lang="de-CH" dirty="0"/>
+          </a:p>
+        </p:txBody>
+      </p:sp>
+      <p:sp>
+        <p:nvSpPr>
+          <p:cNvPr id="4" name="Slide Number Placeholder 3"/>
+          <p:cNvSpPr>
+            <a:spLocks noGrp="1"/>
+          </p:cNvSpPr>
+          <p:nvPr>
+            <p:ph type="sldNum" sz="quarter" idx="10"/>
+          </p:nvPr>
+        </p:nvSpPr>
+        <p:spPr/>
+        <p:txBody>
+          <a:bodyPr/>
+          <a:lstStyle/>
+          <a:p>
+            <a:fld id="{9BCA07FD-5BD5-4529-84B0-48DD2C561176}" type="slidenum">
+              <a:rPr lang="de-CH" smtClean="0"/>
               <a:t>61</a:t>
             </a:fld>
             <a:endParaRPr lang="de-CH"/>
@@ -24784,7 +25026,7 @@
 </p:notes>
 </file>
 
-<file path=ppt/notesSlides/notesSlide53.xml><?xml version="1.0" encoding="utf-8"?>
+<file path=ppt/notesSlides/notesSlide55.xml><?xml version="1.0" encoding="utf-8"?>
 <p:notes xmlns:a="http://schemas.openxmlformats.org/drawingml/2006/main" xmlns:r="http://schemas.openxmlformats.org/officeDocument/2006/relationships" xmlns:p="http://schemas.openxmlformats.org/presentationml/2006/main">
   <p:cSld>
     <p:spTree>
@@ -25712,7 +25954,7 @@
           <a:p>
             <a:fld id="{A2EAEABE-1D59-4413-813E-803E21872067}" type="datetimeFigureOut">
               <a:rPr lang="de-CH" smtClean="0"/>
-              <a:t>27.05.2016</a:t>
+              <a:t>30.05.2016</a:t>
             </a:fld>
             <a:endParaRPr lang="de-CH"/>
           </a:p>
@@ -25882,7 +26124,7 @@
           <a:p>
             <a:fld id="{A2EAEABE-1D59-4413-813E-803E21872067}" type="datetimeFigureOut">
               <a:rPr lang="de-CH" smtClean="0"/>
-              <a:t>27.05.2016</a:t>
+              <a:t>30.05.2016</a:t>
             </a:fld>
             <a:endParaRPr lang="de-CH"/>
           </a:p>
@@ -26062,7 +26304,7 @@
           <a:p>
             <a:fld id="{A2EAEABE-1D59-4413-813E-803E21872067}" type="datetimeFigureOut">
               <a:rPr lang="de-CH" smtClean="0"/>
-              <a:t>27.05.2016</a:t>
+              <a:t>30.05.2016</a:t>
             </a:fld>
             <a:endParaRPr lang="de-CH"/>
           </a:p>
@@ -26231,7 +26473,7 @@
           <a:p>
             <a:fld id="{A2EAEABE-1D59-4413-813E-803E21872067}" type="datetimeFigureOut">
               <a:rPr lang="de-CH" smtClean="0"/>
-              <a:t>27.05.2016</a:t>
+              <a:t>30.05.2016</a:t>
             </a:fld>
             <a:endParaRPr lang="de-CH"/>
           </a:p>
@@ -26477,7 +26719,7 @@
           <a:p>
             <a:fld id="{A2EAEABE-1D59-4413-813E-803E21872067}" type="datetimeFigureOut">
               <a:rPr lang="de-CH" smtClean="0"/>
-              <a:t>27.05.2016</a:t>
+              <a:t>30.05.2016</a:t>
             </a:fld>
             <a:endParaRPr lang="de-CH"/>
           </a:p>
@@ -26709,7 +26951,7 @@
           <a:p>
             <a:fld id="{A2EAEABE-1D59-4413-813E-803E21872067}" type="datetimeFigureOut">
               <a:rPr lang="de-CH" smtClean="0"/>
-              <a:t>27.05.2016</a:t>
+              <a:t>30.05.2016</a:t>
             </a:fld>
             <a:endParaRPr lang="de-CH"/>
           </a:p>
@@ -27076,7 +27318,7 @@
           <a:p>
             <a:fld id="{A2EAEABE-1D59-4413-813E-803E21872067}" type="datetimeFigureOut">
               <a:rPr lang="de-CH" smtClean="0"/>
-              <a:t>27.05.2016</a:t>
+              <a:t>30.05.2016</a:t>
             </a:fld>
             <a:endParaRPr lang="de-CH"/>
           </a:p>
@@ -27194,7 +27436,7 @@
           <a:p>
             <a:fld id="{A2EAEABE-1D59-4413-813E-803E21872067}" type="datetimeFigureOut">
               <a:rPr lang="de-CH" smtClean="0"/>
-              <a:t>27.05.2016</a:t>
+              <a:t>30.05.2016</a:t>
             </a:fld>
             <a:endParaRPr lang="de-CH"/>
           </a:p>
@@ -27289,7 +27531,7 @@
           <a:p>
             <a:fld id="{A2EAEABE-1D59-4413-813E-803E21872067}" type="datetimeFigureOut">
               <a:rPr lang="de-CH" smtClean="0"/>
-              <a:t>27.05.2016</a:t>
+              <a:t>30.05.2016</a:t>
             </a:fld>
             <a:endParaRPr lang="de-CH"/>
           </a:p>
@@ -27566,7 +27808,7 @@
           <a:p>
             <a:fld id="{A2EAEABE-1D59-4413-813E-803E21872067}" type="datetimeFigureOut">
               <a:rPr lang="de-CH" smtClean="0"/>
-              <a:t>27.05.2016</a:t>
+              <a:t>30.05.2016</a:t>
             </a:fld>
             <a:endParaRPr lang="de-CH"/>
           </a:p>
@@ -27823,7 +28065,7 @@
           <a:p>
             <a:fld id="{A2EAEABE-1D59-4413-813E-803E21872067}" type="datetimeFigureOut">
               <a:rPr lang="de-CH" smtClean="0"/>
-              <a:t>27.05.2016</a:t>
+              <a:t>30.05.2016</a:t>
             </a:fld>
             <a:endParaRPr lang="de-CH"/>
           </a:p>
@@ -28034,7 +28276,7 @@
           <a:p>
             <a:fld id="{A2EAEABE-1D59-4413-813E-803E21872067}" type="datetimeFigureOut">
               <a:rPr lang="de-CH" smtClean="0"/>
-              <a:t>27.05.2016</a:t>
+              <a:t>30.05.2016</a:t>
             </a:fld>
             <a:endParaRPr lang="de-CH"/>
           </a:p>
@@ -30820,6 +31062,36 @@
           <a:chExt cx="0" cy="0"/>
         </a:xfrm>
       </p:grpSpPr>
+    </p:spTree>
+    <p:extLst>
+      <p:ext uri="{BB962C8B-B14F-4D97-AF65-F5344CB8AC3E}">
+        <p14:creationId xmlns:p14="http://schemas.microsoft.com/office/powerpoint/2010/main" val="2031791562"/>
+      </p:ext>
+    </p:extLst>
+  </p:cSld>
+  <p:clrMapOvr>
+    <a:masterClrMapping/>
+  </p:clrMapOvr>
+</p:sld>
+</file>
+
+<file path=ppt/slides/slide22.xml><?xml version="1.0" encoding="utf-8"?>
+<p:sld xmlns:a="http://schemas.openxmlformats.org/drawingml/2006/main" xmlns:r="http://schemas.openxmlformats.org/officeDocument/2006/relationships" xmlns:p="http://schemas.openxmlformats.org/presentationml/2006/main">
+  <p:cSld>
+    <p:spTree>
+      <p:nvGrpSpPr>
+        <p:cNvPr id="1" name=""/>
+        <p:cNvGrpSpPr/>
+        <p:nvPr/>
+      </p:nvGrpSpPr>
+      <p:grpSpPr>
+        <a:xfrm>
+          <a:off x="0" y="0"/>
+          <a:ext cx="0" cy="0"/>
+          <a:chOff x="0" y="0"/>
+          <a:chExt cx="0" cy="0"/>
+        </a:xfrm>
+      </p:grpSpPr>
       <p:sp>
         <p:nvSpPr>
           <p:cNvPr id="2" name="Rectangle 1"/>
@@ -31739,7 +32011,7 @@
 </p:sld>
 </file>
 
-<file path=ppt/slides/slide22.xml><?xml version="1.0" encoding="utf-8"?>
+<file path=ppt/slides/slide23.xml><?xml version="1.0" encoding="utf-8"?>
 <p:sld xmlns:a="http://schemas.openxmlformats.org/drawingml/2006/main" xmlns:r="http://schemas.openxmlformats.org/officeDocument/2006/relationships" xmlns:p="http://schemas.openxmlformats.org/presentationml/2006/main">
   <p:cSld>
     <p:spTree>
@@ -32395,7 +32667,7 @@
 </p:sld>
 </file>
 
-<file path=ppt/slides/slide23.xml><?xml version="1.0" encoding="utf-8"?>
+<file path=ppt/slides/slide24.xml><?xml version="1.0" encoding="utf-8"?>
 <p:sld xmlns:a="http://schemas.openxmlformats.org/drawingml/2006/main" xmlns:r="http://schemas.openxmlformats.org/officeDocument/2006/relationships" xmlns:p="http://schemas.openxmlformats.org/presentationml/2006/main">
   <p:cSld>
     <p:spTree>
@@ -33717,7 +33989,7 @@
 </p:sld>
 </file>
 
-<file path=ppt/slides/slide24.xml><?xml version="1.0" encoding="utf-8"?>
+<file path=ppt/slides/slide25.xml><?xml version="1.0" encoding="utf-8"?>
 <p:sld xmlns:a="http://schemas.openxmlformats.org/drawingml/2006/main" xmlns:r="http://schemas.openxmlformats.org/officeDocument/2006/relationships" xmlns:p="http://schemas.openxmlformats.org/presentationml/2006/main">
   <p:cSld>
     <p:spTree>
@@ -33769,7 +34041,7 @@
 </p:sld>
 </file>
 
-<file path=ppt/slides/slide25.xml><?xml version="1.0" encoding="utf-8"?>
+<file path=ppt/slides/slide26.xml><?xml version="1.0" encoding="utf-8"?>
 <p:sld xmlns:a="http://schemas.openxmlformats.org/drawingml/2006/main" xmlns:r="http://schemas.openxmlformats.org/officeDocument/2006/relationships" xmlns:p="http://schemas.openxmlformats.org/presentationml/2006/main">
   <p:cSld>
     <p:spTree>
@@ -34057,7 +34329,7 @@
 </p:sld>
 </file>
 
-<file path=ppt/slides/slide26.xml><?xml version="1.0" encoding="utf-8"?>
+<file path=ppt/slides/slide27.xml><?xml version="1.0" encoding="utf-8"?>
 <p:sld xmlns:a="http://schemas.openxmlformats.org/drawingml/2006/main" xmlns:r="http://schemas.openxmlformats.org/officeDocument/2006/relationships" xmlns:p="http://schemas.openxmlformats.org/presentationml/2006/main">
   <p:cSld>
     <p:spTree>
@@ -34622,7 +34894,7 @@
 </p:sld>
 </file>
 
-<file path=ppt/slides/slide27.xml><?xml version="1.0" encoding="utf-8"?>
+<file path=ppt/slides/slide28.xml><?xml version="1.0" encoding="utf-8"?>
 <p:sld xmlns:a="http://schemas.openxmlformats.org/drawingml/2006/main" xmlns:r="http://schemas.openxmlformats.org/officeDocument/2006/relationships" xmlns:p="http://schemas.openxmlformats.org/presentationml/2006/main">
   <p:cSld>
     <p:spTree>
@@ -35197,7 +35469,7 @@
 </p:sld>
 </file>
 
-<file path=ppt/slides/slide28.xml><?xml version="1.0" encoding="utf-8"?>
+<file path=ppt/slides/slide29.xml><?xml version="1.0" encoding="utf-8"?>
 <p:sld xmlns:a="http://schemas.openxmlformats.org/drawingml/2006/main" xmlns:r="http://schemas.openxmlformats.org/officeDocument/2006/relationships" xmlns:p="http://schemas.openxmlformats.org/presentationml/2006/main">
   <p:cSld>
     <p:spTree>
@@ -35512,7 +35784,286 @@
 </p:sld>
 </file>
 
-<file path=ppt/slides/slide29.xml><?xml version="1.0" encoding="utf-8"?>
+<file path=ppt/slides/slide3.xml><?xml version="1.0" encoding="utf-8"?>
+<p:sld xmlns:a="http://schemas.openxmlformats.org/drawingml/2006/main" xmlns:r="http://schemas.openxmlformats.org/officeDocument/2006/relationships" xmlns:p="http://schemas.openxmlformats.org/presentationml/2006/main">
+  <p:cSld>
+    <p:spTree>
+      <p:nvGrpSpPr>
+        <p:cNvPr id="1" name=""/>
+        <p:cNvGrpSpPr/>
+        <p:nvPr/>
+      </p:nvGrpSpPr>
+      <p:grpSpPr>
+        <a:xfrm>
+          <a:off x="0" y="0"/>
+          <a:ext cx="0" cy="0"/>
+          <a:chOff x="0" y="0"/>
+          <a:chExt cx="0" cy="0"/>
+        </a:xfrm>
+      </p:grpSpPr>
+      <p:sp>
+        <p:nvSpPr>
+          <p:cNvPr id="5" name="Rectangle 4"/>
+          <p:cNvSpPr/>
+          <p:nvPr/>
+        </p:nvSpPr>
+        <p:spPr>
+          <a:xfrm>
+            <a:off x="0" y="1952437"/>
+            <a:ext cx="4999912" cy="2646878"/>
+          </a:xfrm>
+          <a:prstGeom prst="rect">
+            <a:avLst/>
+          </a:prstGeom>
+        </p:spPr>
+        <p:txBody>
+          <a:bodyPr wrap="square">
+            <a:spAutoFit/>
+          </a:bodyPr>
+          <a:lstStyle/>
+          <a:p>
+            <a:pPr algn="ctr"/>
+            <a:r>
+              <a:rPr lang="en-US" sz="16600" dirty="0">
+                <a:solidFill>
+                  <a:schemeClr val="accent2"/>
+                </a:solidFill>
+                <a:latin typeface="Yanone Kaffeesatz Regular" panose="02000000000000000000" pitchFamily="2" charset="0"/>
+              </a:rPr>
+              <a:t>Goals</a:t>
+            </a:r>
+            <a:endParaRPr lang="de-CH" dirty="0"/>
+          </a:p>
+        </p:txBody>
+      </p:sp>
+      <p:sp>
+        <p:nvSpPr>
+          <p:cNvPr id="6" name="Rectangle 5"/>
+          <p:cNvSpPr/>
+          <p:nvPr/>
+        </p:nvSpPr>
+        <p:spPr>
+          <a:xfrm>
+            <a:off x="6485271" y="1290717"/>
+            <a:ext cx="5706729" cy="3970318"/>
+          </a:xfrm>
+          <a:prstGeom prst="rect">
+            <a:avLst/>
+          </a:prstGeom>
+        </p:spPr>
+        <p:txBody>
+          <a:bodyPr wrap="square">
+            <a:spAutoFit/>
+          </a:bodyPr>
+          <a:lstStyle/>
+          <a:p>
+            <a:r>
+              <a:rPr lang="en-US" sz="3600" dirty="0">
+                <a:solidFill>
+                  <a:schemeClr val="accent4"/>
+                </a:solidFill>
+                <a:latin typeface="Yanone Kaffeesatz Regular" panose="02000000000000000000" pitchFamily="2" charset="0"/>
+              </a:rPr>
+              <a:t>CPU</a:t>
+            </a:r>
+            <a:r>
+              <a:rPr lang="en-US" sz="3600" dirty="0">
+                <a:solidFill>
+                  <a:schemeClr val="tx2"/>
+                </a:solidFill>
+                <a:latin typeface="Yanone Kaffeesatz Regular" panose="02000000000000000000" pitchFamily="2" charset="0"/>
+              </a:rPr>
+              <a:t>-bound vs </a:t>
+            </a:r>
+            <a:r>
+              <a:rPr lang="en-US" sz="3600" dirty="0">
+                <a:solidFill>
+                  <a:schemeClr val="accent4"/>
+                </a:solidFill>
+                <a:latin typeface="Yanone Kaffeesatz Regular" panose="02000000000000000000" pitchFamily="2" charset="0"/>
+              </a:rPr>
+              <a:t>IO</a:t>
+            </a:r>
+            <a:r>
+              <a:rPr lang="en-US" sz="3600" dirty="0">
+                <a:solidFill>
+                  <a:schemeClr val="tx2"/>
+                </a:solidFill>
+                <a:latin typeface="Yanone Kaffeesatz Regular" panose="02000000000000000000" pitchFamily="2" charset="0"/>
+              </a:rPr>
+              <a:t>-bound</a:t>
+            </a:r>
+          </a:p>
+          <a:p>
+            <a:endParaRPr lang="en-US" sz="3600" dirty="0">
+              <a:solidFill>
+                <a:schemeClr val="tx2"/>
+              </a:solidFill>
+              <a:latin typeface="Yanone Kaffeesatz Regular" panose="02000000000000000000" pitchFamily="2" charset="0"/>
+            </a:endParaRPr>
+          </a:p>
+          <a:p>
+            <a:r>
+              <a:rPr lang="en-US" sz="3600" dirty="0">
+                <a:solidFill>
+                  <a:schemeClr val="accent4"/>
+                </a:solidFill>
+                <a:latin typeface="Yanone Kaffeesatz Regular" panose="02000000000000000000" pitchFamily="2" charset="0"/>
+              </a:rPr>
+              <a:t>Threads</a:t>
+            </a:r>
+            <a:r>
+              <a:rPr lang="en-US" sz="3600" dirty="0">
+                <a:solidFill>
+                  <a:schemeClr val="tx2"/>
+                </a:solidFill>
+                <a:latin typeface="Yanone Kaffeesatz Regular" panose="02000000000000000000" pitchFamily="2" charset="0"/>
+              </a:rPr>
+              <a:t> and </a:t>
+            </a:r>
+            <a:r>
+              <a:rPr lang="en-US" sz="3600" dirty="0">
+                <a:solidFill>
+                  <a:schemeClr val="accent4"/>
+                </a:solidFill>
+                <a:latin typeface="Yanone Kaffeesatz Regular" panose="02000000000000000000" pitchFamily="2" charset="0"/>
+              </a:rPr>
+              <a:t>Tasks</a:t>
+            </a:r>
+          </a:p>
+          <a:p>
+            <a:endParaRPr lang="en-US" sz="3600" dirty="0">
+              <a:solidFill>
+                <a:schemeClr val="tx2"/>
+              </a:solidFill>
+              <a:latin typeface="Yanone Kaffeesatz Regular" panose="02000000000000000000" pitchFamily="2" charset="0"/>
+            </a:endParaRPr>
+          </a:p>
+          <a:p>
+            <a:r>
+              <a:rPr lang="en-US" sz="3600" dirty="0" err="1">
+                <a:solidFill>
+                  <a:schemeClr val="tx2"/>
+                </a:solidFill>
+                <a:latin typeface="Yanone Kaffeesatz Regular" panose="02000000000000000000" pitchFamily="2" charset="0"/>
+              </a:rPr>
+              <a:t>Async</a:t>
+            </a:r>
+            <a:r>
+              <a:rPr lang="en-US" sz="3600" dirty="0">
+                <a:solidFill>
+                  <a:schemeClr val="tx2"/>
+                </a:solidFill>
+                <a:latin typeface="Yanone Kaffeesatz Regular" panose="02000000000000000000" pitchFamily="2" charset="0"/>
+              </a:rPr>
+              <a:t> </a:t>
+            </a:r>
+            <a:r>
+              <a:rPr lang="en-US" sz="3600" dirty="0">
+                <a:solidFill>
+                  <a:schemeClr val="accent4"/>
+                </a:solidFill>
+                <a:latin typeface="Yanone Kaffeesatz Regular" panose="02000000000000000000" pitchFamily="2" charset="0"/>
+              </a:rPr>
+              <a:t>best-practices</a:t>
+            </a:r>
+          </a:p>
+          <a:p>
+            <a:endParaRPr lang="en-US" sz="3600" dirty="0">
+              <a:solidFill>
+                <a:schemeClr val="accent4"/>
+              </a:solidFill>
+              <a:latin typeface="Yanone Kaffeesatz Regular" panose="02000000000000000000" pitchFamily="2" charset="0"/>
+            </a:endParaRPr>
+          </a:p>
+          <a:p>
+            <a:r>
+              <a:rPr lang="en-US" sz="3600" dirty="0">
+                <a:solidFill>
+                  <a:schemeClr val="tx2"/>
+                </a:solidFill>
+                <a:latin typeface="Yanone Kaffeesatz Regular" panose="02000000000000000000" pitchFamily="2" charset="0"/>
+              </a:rPr>
+              <a:t>Why </a:t>
+            </a:r>
+            <a:r>
+              <a:rPr lang="en-US" sz="3600" dirty="0" err="1">
+                <a:solidFill>
+                  <a:schemeClr val="tx2"/>
+                </a:solidFill>
+                <a:latin typeface="Yanone Kaffeesatz Regular" panose="02000000000000000000" pitchFamily="2" charset="0"/>
+              </a:rPr>
+              <a:t>async</a:t>
+            </a:r>
+            <a:r>
+              <a:rPr lang="en-US" sz="3600" dirty="0">
+                <a:solidFill>
+                  <a:schemeClr val="tx2"/>
+                </a:solidFill>
+                <a:latin typeface="Yanone Kaffeesatz Regular" panose="02000000000000000000" pitchFamily="2" charset="0"/>
+              </a:rPr>
+              <a:t> is</a:t>
+            </a:r>
+            <a:r>
+              <a:rPr lang="en-US" sz="3600" dirty="0">
+                <a:solidFill>
+                  <a:schemeClr val="accent4"/>
+                </a:solidFill>
+                <a:latin typeface="Yanone Kaffeesatz Regular" panose="02000000000000000000" pitchFamily="2" charset="0"/>
+              </a:rPr>
+              <a:t> the future</a:t>
+            </a:r>
+          </a:p>
+        </p:txBody>
+      </p:sp>
+      <p:sp>
+        <p:nvSpPr>
+          <p:cNvPr id="7" name="Rectangle 6"/>
+          <p:cNvSpPr/>
+          <p:nvPr/>
+        </p:nvSpPr>
+        <p:spPr>
+          <a:xfrm>
+            <a:off x="1" y="4399885"/>
+            <a:ext cx="6494332" cy="1200329"/>
+          </a:xfrm>
+          <a:prstGeom prst="rect">
+            <a:avLst/>
+          </a:prstGeom>
+        </p:spPr>
+        <p:txBody>
+          <a:bodyPr wrap="square">
+            <a:spAutoFit/>
+          </a:bodyPr>
+          <a:lstStyle/>
+          <a:p>
+            <a:pPr algn="ctr"/>
+            <a:r>
+              <a:rPr lang="en-US" sz="7200" dirty="0">
+                <a:solidFill>
+                  <a:schemeClr val="accent3"/>
+                </a:solidFill>
+                <a:latin typeface="Yanone Kaffeesatz Regular" panose="02000000000000000000" pitchFamily="2" charset="0"/>
+              </a:rPr>
+              <a:t>target</a:t>
+            </a:r>
+          </a:p>
+        </p:txBody>
+      </p:sp>
+    </p:spTree>
+    <p:extLst>
+      <p:ext uri="{BB962C8B-B14F-4D97-AF65-F5344CB8AC3E}">
+        <p14:creationId xmlns:p14="http://schemas.microsoft.com/office/powerpoint/2010/main" val="2864408021"/>
+      </p:ext>
+    </p:extLst>
+  </p:cSld>
+  <p:clrMapOvr>
+    <a:masterClrMapping/>
+  </p:clrMapOvr>
+</p:sld>
+</file>
+
+<file path=ppt/slides/slide30.xml><?xml version="1.0" encoding="utf-8"?>
 <p:sld xmlns:a="http://schemas.openxmlformats.org/drawingml/2006/main" xmlns:r="http://schemas.openxmlformats.org/officeDocument/2006/relationships" xmlns:p="http://schemas.openxmlformats.org/presentationml/2006/main">
   <p:cSld>
     <p:spTree>
@@ -35947,286 +36498,7 @@
 </p:sld>
 </file>
 
-<file path=ppt/slides/slide3.xml><?xml version="1.0" encoding="utf-8"?>
-<p:sld xmlns:a="http://schemas.openxmlformats.org/drawingml/2006/main" xmlns:r="http://schemas.openxmlformats.org/officeDocument/2006/relationships" xmlns:p="http://schemas.openxmlformats.org/presentationml/2006/main">
-  <p:cSld>
-    <p:spTree>
-      <p:nvGrpSpPr>
-        <p:cNvPr id="1" name=""/>
-        <p:cNvGrpSpPr/>
-        <p:nvPr/>
-      </p:nvGrpSpPr>
-      <p:grpSpPr>
-        <a:xfrm>
-          <a:off x="0" y="0"/>
-          <a:ext cx="0" cy="0"/>
-          <a:chOff x="0" y="0"/>
-          <a:chExt cx="0" cy="0"/>
-        </a:xfrm>
-      </p:grpSpPr>
-      <p:sp>
-        <p:nvSpPr>
-          <p:cNvPr id="5" name="Rectangle 4"/>
-          <p:cNvSpPr/>
-          <p:nvPr/>
-        </p:nvSpPr>
-        <p:spPr>
-          <a:xfrm>
-            <a:off x="0" y="1952437"/>
-            <a:ext cx="4999912" cy="2646878"/>
-          </a:xfrm>
-          <a:prstGeom prst="rect">
-            <a:avLst/>
-          </a:prstGeom>
-        </p:spPr>
-        <p:txBody>
-          <a:bodyPr wrap="square">
-            <a:spAutoFit/>
-          </a:bodyPr>
-          <a:lstStyle/>
-          <a:p>
-            <a:pPr algn="ctr"/>
-            <a:r>
-              <a:rPr lang="en-US" sz="16600" dirty="0">
-                <a:solidFill>
-                  <a:schemeClr val="accent2"/>
-                </a:solidFill>
-                <a:latin typeface="Yanone Kaffeesatz Regular" panose="02000000000000000000" pitchFamily="2" charset="0"/>
-              </a:rPr>
-              <a:t>Goals</a:t>
-            </a:r>
-            <a:endParaRPr lang="de-CH" dirty="0"/>
-          </a:p>
-        </p:txBody>
-      </p:sp>
-      <p:sp>
-        <p:nvSpPr>
-          <p:cNvPr id="6" name="Rectangle 5"/>
-          <p:cNvSpPr/>
-          <p:nvPr/>
-        </p:nvSpPr>
-        <p:spPr>
-          <a:xfrm>
-            <a:off x="6485271" y="1290717"/>
-            <a:ext cx="5706729" cy="3970318"/>
-          </a:xfrm>
-          <a:prstGeom prst="rect">
-            <a:avLst/>
-          </a:prstGeom>
-        </p:spPr>
-        <p:txBody>
-          <a:bodyPr wrap="square">
-            <a:spAutoFit/>
-          </a:bodyPr>
-          <a:lstStyle/>
-          <a:p>
-            <a:r>
-              <a:rPr lang="en-US" sz="3600" dirty="0">
-                <a:solidFill>
-                  <a:schemeClr val="accent4"/>
-                </a:solidFill>
-                <a:latin typeface="Yanone Kaffeesatz Regular" panose="02000000000000000000" pitchFamily="2" charset="0"/>
-              </a:rPr>
-              <a:t>CPU</a:t>
-            </a:r>
-            <a:r>
-              <a:rPr lang="en-US" sz="3600" dirty="0">
-                <a:solidFill>
-                  <a:schemeClr val="tx2"/>
-                </a:solidFill>
-                <a:latin typeface="Yanone Kaffeesatz Regular" panose="02000000000000000000" pitchFamily="2" charset="0"/>
-              </a:rPr>
-              <a:t>-bound vs </a:t>
-            </a:r>
-            <a:r>
-              <a:rPr lang="en-US" sz="3600" dirty="0">
-                <a:solidFill>
-                  <a:schemeClr val="accent4"/>
-                </a:solidFill>
-                <a:latin typeface="Yanone Kaffeesatz Regular" panose="02000000000000000000" pitchFamily="2" charset="0"/>
-              </a:rPr>
-              <a:t>IO</a:t>
-            </a:r>
-            <a:r>
-              <a:rPr lang="en-US" sz="3600" dirty="0">
-                <a:solidFill>
-                  <a:schemeClr val="tx2"/>
-                </a:solidFill>
-                <a:latin typeface="Yanone Kaffeesatz Regular" panose="02000000000000000000" pitchFamily="2" charset="0"/>
-              </a:rPr>
-              <a:t>-bound</a:t>
-            </a:r>
-          </a:p>
-          <a:p>
-            <a:endParaRPr lang="en-US" sz="3600" dirty="0">
-              <a:solidFill>
-                <a:schemeClr val="tx2"/>
-              </a:solidFill>
-              <a:latin typeface="Yanone Kaffeesatz Regular" panose="02000000000000000000" pitchFamily="2" charset="0"/>
-            </a:endParaRPr>
-          </a:p>
-          <a:p>
-            <a:r>
-              <a:rPr lang="en-US" sz="3600" dirty="0">
-                <a:solidFill>
-                  <a:schemeClr val="accent4"/>
-                </a:solidFill>
-                <a:latin typeface="Yanone Kaffeesatz Regular" panose="02000000000000000000" pitchFamily="2" charset="0"/>
-              </a:rPr>
-              <a:t>Threads</a:t>
-            </a:r>
-            <a:r>
-              <a:rPr lang="en-US" sz="3600" dirty="0">
-                <a:solidFill>
-                  <a:schemeClr val="tx2"/>
-                </a:solidFill>
-                <a:latin typeface="Yanone Kaffeesatz Regular" panose="02000000000000000000" pitchFamily="2" charset="0"/>
-              </a:rPr>
-              <a:t> and </a:t>
-            </a:r>
-            <a:r>
-              <a:rPr lang="en-US" sz="3600" dirty="0">
-                <a:solidFill>
-                  <a:schemeClr val="accent4"/>
-                </a:solidFill>
-                <a:latin typeface="Yanone Kaffeesatz Regular" panose="02000000000000000000" pitchFamily="2" charset="0"/>
-              </a:rPr>
-              <a:t>Tasks</a:t>
-            </a:r>
-          </a:p>
-          <a:p>
-            <a:endParaRPr lang="en-US" sz="3600" dirty="0">
-              <a:solidFill>
-                <a:schemeClr val="tx2"/>
-              </a:solidFill>
-              <a:latin typeface="Yanone Kaffeesatz Regular" panose="02000000000000000000" pitchFamily="2" charset="0"/>
-            </a:endParaRPr>
-          </a:p>
-          <a:p>
-            <a:r>
-              <a:rPr lang="en-US" sz="3600" dirty="0" err="1">
-                <a:solidFill>
-                  <a:schemeClr val="tx2"/>
-                </a:solidFill>
-                <a:latin typeface="Yanone Kaffeesatz Regular" panose="02000000000000000000" pitchFamily="2" charset="0"/>
-              </a:rPr>
-              <a:t>Async</a:t>
-            </a:r>
-            <a:r>
-              <a:rPr lang="en-US" sz="3600" dirty="0">
-                <a:solidFill>
-                  <a:schemeClr val="tx2"/>
-                </a:solidFill>
-                <a:latin typeface="Yanone Kaffeesatz Regular" panose="02000000000000000000" pitchFamily="2" charset="0"/>
-              </a:rPr>
-              <a:t> </a:t>
-            </a:r>
-            <a:r>
-              <a:rPr lang="en-US" sz="3600" dirty="0">
-                <a:solidFill>
-                  <a:schemeClr val="accent4"/>
-                </a:solidFill>
-                <a:latin typeface="Yanone Kaffeesatz Regular" panose="02000000000000000000" pitchFamily="2" charset="0"/>
-              </a:rPr>
-              <a:t>best-practices</a:t>
-            </a:r>
-          </a:p>
-          <a:p>
-            <a:endParaRPr lang="en-US" sz="3600" dirty="0">
-              <a:solidFill>
-                <a:schemeClr val="accent4"/>
-              </a:solidFill>
-              <a:latin typeface="Yanone Kaffeesatz Regular" panose="02000000000000000000" pitchFamily="2" charset="0"/>
-            </a:endParaRPr>
-          </a:p>
-          <a:p>
-            <a:r>
-              <a:rPr lang="en-US" sz="3600" dirty="0">
-                <a:solidFill>
-                  <a:schemeClr val="tx2"/>
-                </a:solidFill>
-                <a:latin typeface="Yanone Kaffeesatz Regular" panose="02000000000000000000" pitchFamily="2" charset="0"/>
-              </a:rPr>
-              <a:t>Why </a:t>
-            </a:r>
-            <a:r>
-              <a:rPr lang="en-US" sz="3600" dirty="0" err="1">
-                <a:solidFill>
-                  <a:schemeClr val="tx2"/>
-                </a:solidFill>
-                <a:latin typeface="Yanone Kaffeesatz Regular" panose="02000000000000000000" pitchFamily="2" charset="0"/>
-              </a:rPr>
-              <a:t>async</a:t>
-            </a:r>
-            <a:r>
-              <a:rPr lang="en-US" sz="3600" dirty="0">
-                <a:solidFill>
-                  <a:schemeClr val="tx2"/>
-                </a:solidFill>
-                <a:latin typeface="Yanone Kaffeesatz Regular" panose="02000000000000000000" pitchFamily="2" charset="0"/>
-              </a:rPr>
-              <a:t> is</a:t>
-            </a:r>
-            <a:r>
-              <a:rPr lang="en-US" sz="3600" dirty="0">
-                <a:solidFill>
-                  <a:schemeClr val="accent4"/>
-                </a:solidFill>
-                <a:latin typeface="Yanone Kaffeesatz Regular" panose="02000000000000000000" pitchFamily="2" charset="0"/>
-              </a:rPr>
-              <a:t> the future</a:t>
-            </a:r>
-          </a:p>
-        </p:txBody>
-      </p:sp>
-      <p:sp>
-        <p:nvSpPr>
-          <p:cNvPr id="7" name="Rectangle 6"/>
-          <p:cNvSpPr/>
-          <p:nvPr/>
-        </p:nvSpPr>
-        <p:spPr>
-          <a:xfrm>
-            <a:off x="1" y="4399885"/>
-            <a:ext cx="6494332" cy="1200329"/>
-          </a:xfrm>
-          <a:prstGeom prst="rect">
-            <a:avLst/>
-          </a:prstGeom>
-        </p:spPr>
-        <p:txBody>
-          <a:bodyPr wrap="square">
-            <a:spAutoFit/>
-          </a:bodyPr>
-          <a:lstStyle/>
-          <a:p>
-            <a:pPr algn="ctr"/>
-            <a:r>
-              <a:rPr lang="en-US" sz="7200" dirty="0">
-                <a:solidFill>
-                  <a:schemeClr val="accent3"/>
-                </a:solidFill>
-                <a:latin typeface="Yanone Kaffeesatz Regular" panose="02000000000000000000" pitchFamily="2" charset="0"/>
-              </a:rPr>
-              <a:t>target</a:t>
-            </a:r>
-          </a:p>
-        </p:txBody>
-      </p:sp>
-    </p:spTree>
-    <p:extLst>
-      <p:ext uri="{BB962C8B-B14F-4D97-AF65-F5344CB8AC3E}">
-        <p14:creationId xmlns:p14="http://schemas.microsoft.com/office/powerpoint/2010/main" val="2864408021"/>
-      </p:ext>
-    </p:extLst>
-  </p:cSld>
-  <p:clrMapOvr>
-    <a:masterClrMapping/>
-  </p:clrMapOvr>
-</p:sld>
-</file>
-
-<file path=ppt/slides/slide30.xml><?xml version="1.0" encoding="utf-8"?>
+<file path=ppt/slides/slide31.xml><?xml version="1.0" encoding="utf-8"?>
 <p:sld xmlns:a="http://schemas.openxmlformats.org/drawingml/2006/main" xmlns:r="http://schemas.openxmlformats.org/officeDocument/2006/relationships" xmlns:p="http://schemas.openxmlformats.org/presentationml/2006/main">
   <p:cSld>
     <p:spTree>
@@ -36506,7 +36778,7 @@
                 </a:solidFill>
                 <a:latin typeface="Yanone Kaffeesatz Regular" panose="02000000000000000000" pitchFamily="2" charset="0"/>
               </a:rPr>
-              <a:t>ar</a:t>
+              <a:t>var</a:t>
             </a:r>
             <a:r>
               <a:rPr lang="en-US" sz="2800" dirty="0">
@@ -36699,7 +36971,7 @@
         <p:spPr>
           <a:xfrm>
             <a:off x="8002959" y="2814674"/>
-            <a:ext cx="3768980" cy="1077218"/>
+            <a:ext cx="3254417" cy="1077218"/>
           </a:xfrm>
           <a:prstGeom prst="rect">
             <a:avLst/>
@@ -36718,7 +36990,7 @@
                 </a:solidFill>
                 <a:latin typeface="Yanone Kaffeesatz Regular" panose="02000000000000000000" pitchFamily="2" charset="0"/>
               </a:rPr>
-              <a:t>01:08:14:093: Entering wait</a:t>
+              <a:t>01:08:14: Entering wait</a:t>
             </a:r>
           </a:p>
           <a:p>
@@ -36729,7 +37001,7 @@
                 </a:solidFill>
                 <a:latin typeface="Yanone Kaffeesatz Regular" panose="02000000000000000000" pitchFamily="2" charset="0"/>
               </a:rPr>
-              <a:t>01:08:16:094: Continue</a:t>
+              <a:t>01:08:16: Continue</a:t>
             </a:r>
           </a:p>
         </p:txBody>
@@ -36842,7 +37114,7 @@
 </p:sld>
 </file>
 
-<file path=ppt/slides/slide31.xml><?xml version="1.0" encoding="utf-8"?>
+<file path=ppt/slides/slide32.xml><?xml version="1.0" encoding="utf-8"?>
 <p:sld xmlns:a="http://schemas.openxmlformats.org/drawingml/2006/main" xmlns:r="http://schemas.openxmlformats.org/officeDocument/2006/relationships" xmlns:p="http://schemas.openxmlformats.org/presentationml/2006/main">
   <p:cSld>
     <p:spTree>
@@ -37202,7 +37474,7 @@
 </p:sld>
 </file>
 
-<file path=ppt/slides/slide32.xml><?xml version="1.0" encoding="utf-8"?>
+<file path=ppt/slides/slide33.xml><?xml version="1.0" encoding="utf-8"?>
 <p:sld xmlns:a="http://schemas.openxmlformats.org/drawingml/2006/main" xmlns:r="http://schemas.openxmlformats.org/officeDocument/2006/relationships" xmlns:p="http://schemas.openxmlformats.org/presentationml/2006/main">
   <p:cSld>
     <p:spTree>
@@ -37582,7 +37854,7 @@
 </p:sld>
 </file>
 
-<file path=ppt/slides/slide33.xml><?xml version="1.0" encoding="utf-8"?>
+<file path=ppt/slides/slide34.xml><?xml version="1.0" encoding="utf-8"?>
 <p:sld xmlns:a="http://schemas.openxmlformats.org/drawingml/2006/main" xmlns:r="http://schemas.openxmlformats.org/officeDocument/2006/relationships" xmlns:p="http://schemas.openxmlformats.org/presentationml/2006/main">
   <p:cSld>
     <p:spTree>
@@ -38125,7 +38397,7 @@
 </p:sld>
 </file>
 
-<file path=ppt/slides/slide34.xml><?xml version="1.0" encoding="utf-8"?>
+<file path=ppt/slides/slide35.xml><?xml version="1.0" encoding="utf-8"?>
 <p:sld xmlns:a="http://schemas.openxmlformats.org/drawingml/2006/main" xmlns:r="http://schemas.openxmlformats.org/officeDocument/2006/relationships" xmlns:p="http://schemas.openxmlformats.org/presentationml/2006/main">
   <p:cSld>
     <p:spTree>
@@ -38548,7 +38820,7 @@
 </p:sld>
 </file>
 
-<file path=ppt/slides/slide35.xml><?xml version="1.0" encoding="utf-8"?>
+<file path=ppt/slides/slide36.xml><?xml version="1.0" encoding="utf-8"?>
 <p:sld xmlns:a="http://schemas.openxmlformats.org/drawingml/2006/main" xmlns:r="http://schemas.openxmlformats.org/officeDocument/2006/relationships" xmlns:p="http://schemas.openxmlformats.org/presentationml/2006/main">
   <p:cSld>
     <p:spTree>
@@ -39078,7 +39350,7 @@
 </p:sld>
 </file>
 
-<file path=ppt/slides/slide36.xml><?xml version="1.0" encoding="utf-8"?>
+<file path=ppt/slides/slide37.xml><?xml version="1.0" encoding="utf-8"?>
 <p:sld xmlns:a="http://schemas.openxmlformats.org/drawingml/2006/main" xmlns:r="http://schemas.openxmlformats.org/officeDocument/2006/relationships" xmlns:p="http://schemas.openxmlformats.org/presentationml/2006/main">
   <p:cSld>
     <p:spTree>
@@ -39313,7 +39585,7 @@
 </p:sld>
 </file>
 
-<file path=ppt/slides/slide37.xml><?xml version="1.0" encoding="utf-8"?>
+<file path=ppt/slides/slide38.xml><?xml version="1.0" encoding="utf-8"?>
 <p:sld xmlns:a="http://schemas.openxmlformats.org/drawingml/2006/main" xmlns:r="http://schemas.openxmlformats.org/officeDocument/2006/relationships" xmlns:p="http://schemas.openxmlformats.org/presentationml/2006/main">
   <p:cSld>
     <p:spTree>
@@ -39463,7 +39735,7 @@
 </p:sld>
 </file>
 
-<file path=ppt/slides/slide38.xml><?xml version="1.0" encoding="utf-8"?>
+<file path=ppt/slides/slide39.xml><?xml version="1.0" encoding="utf-8"?>
 <p:sld xmlns:a="http://schemas.openxmlformats.org/drawingml/2006/main" xmlns:r="http://schemas.openxmlformats.org/officeDocument/2006/relationships" xmlns:p="http://schemas.openxmlformats.org/presentationml/2006/main">
   <p:cSld>
     <p:spTree>
@@ -39515,7 +39787,72 @@
 </p:sld>
 </file>
 
-<file path=ppt/slides/slide39.xml><?xml version="1.0" encoding="utf-8"?>
+<file path=ppt/slides/slide4.xml><?xml version="1.0" encoding="utf-8"?>
+<p:sld xmlns:a="http://schemas.openxmlformats.org/drawingml/2006/main" xmlns:r="http://schemas.openxmlformats.org/officeDocument/2006/relationships" xmlns:p="http://schemas.openxmlformats.org/presentationml/2006/main">
+  <p:cSld>
+    <p:spTree>
+      <p:nvGrpSpPr>
+        <p:cNvPr id="1" name=""/>
+        <p:cNvGrpSpPr/>
+        <p:nvPr/>
+      </p:nvGrpSpPr>
+      <p:grpSpPr>
+        <a:xfrm>
+          <a:off x="0" y="0"/>
+          <a:ext cx="0" cy="0"/>
+          <a:chOff x="0" y="0"/>
+          <a:chExt cx="0" cy="0"/>
+        </a:xfrm>
+      </p:grpSpPr>
+      <p:sp>
+        <p:nvSpPr>
+          <p:cNvPr id="2" name="Rectangle 1"/>
+          <p:cNvSpPr/>
+          <p:nvPr/>
+        </p:nvSpPr>
+        <p:spPr>
+          <a:xfrm>
+            <a:off x="0" y="1952437"/>
+            <a:ext cx="4999912" cy="2215991"/>
+          </a:xfrm>
+          <a:prstGeom prst="rect">
+            <a:avLst/>
+          </a:prstGeom>
+        </p:spPr>
+        <p:txBody>
+          <a:bodyPr wrap="square">
+            <a:spAutoFit/>
+          </a:bodyPr>
+          <a:lstStyle/>
+          <a:p>
+            <a:pPr algn="ctr"/>
+            <a:r>
+              <a:rPr lang="en-US" sz="13800" dirty="0">
+                <a:solidFill>
+                  <a:schemeClr val="accent2"/>
+                </a:solidFill>
+                <a:latin typeface="Yanone Kaffeesatz Regular" panose="02000000000000000000" pitchFamily="2" charset="0"/>
+              </a:rPr>
+              <a:t>Premise</a:t>
+            </a:r>
+            <a:endParaRPr lang="de-CH" sz="1600" dirty="0"/>
+          </a:p>
+        </p:txBody>
+      </p:sp>
+    </p:spTree>
+    <p:extLst>
+      <p:ext uri="{BB962C8B-B14F-4D97-AF65-F5344CB8AC3E}">
+        <p14:creationId xmlns:p14="http://schemas.microsoft.com/office/powerpoint/2010/main" val="1358001949"/>
+      </p:ext>
+    </p:extLst>
+  </p:cSld>
+  <p:clrMapOvr>
+    <a:masterClrMapping/>
+  </p:clrMapOvr>
+</p:sld>
+</file>
+
+<file path=ppt/slides/slide40.xml><?xml version="1.0" encoding="utf-8"?>
 <p:sld xmlns:a="http://schemas.openxmlformats.org/drawingml/2006/main" xmlns:r="http://schemas.openxmlformats.org/officeDocument/2006/relationships" xmlns:p="http://schemas.openxmlformats.org/presentationml/2006/main">
   <p:cSld>
     <p:spTree>
@@ -39951,72 +40288,7 @@
 </p:sld>
 </file>
 
-<file path=ppt/slides/slide4.xml><?xml version="1.0" encoding="utf-8"?>
-<p:sld xmlns:a="http://schemas.openxmlformats.org/drawingml/2006/main" xmlns:r="http://schemas.openxmlformats.org/officeDocument/2006/relationships" xmlns:p="http://schemas.openxmlformats.org/presentationml/2006/main">
-  <p:cSld>
-    <p:spTree>
-      <p:nvGrpSpPr>
-        <p:cNvPr id="1" name=""/>
-        <p:cNvGrpSpPr/>
-        <p:nvPr/>
-      </p:nvGrpSpPr>
-      <p:grpSpPr>
-        <a:xfrm>
-          <a:off x="0" y="0"/>
-          <a:ext cx="0" cy="0"/>
-          <a:chOff x="0" y="0"/>
-          <a:chExt cx="0" cy="0"/>
-        </a:xfrm>
-      </p:grpSpPr>
-      <p:sp>
-        <p:nvSpPr>
-          <p:cNvPr id="2" name="Rectangle 1"/>
-          <p:cNvSpPr/>
-          <p:nvPr/>
-        </p:nvSpPr>
-        <p:spPr>
-          <a:xfrm>
-            <a:off x="0" y="1952437"/>
-            <a:ext cx="4999912" cy="2215991"/>
-          </a:xfrm>
-          <a:prstGeom prst="rect">
-            <a:avLst/>
-          </a:prstGeom>
-        </p:spPr>
-        <p:txBody>
-          <a:bodyPr wrap="square">
-            <a:spAutoFit/>
-          </a:bodyPr>
-          <a:lstStyle/>
-          <a:p>
-            <a:pPr algn="ctr"/>
-            <a:r>
-              <a:rPr lang="en-US" sz="13800" dirty="0">
-                <a:solidFill>
-                  <a:schemeClr val="accent2"/>
-                </a:solidFill>
-                <a:latin typeface="Yanone Kaffeesatz Regular" panose="02000000000000000000" pitchFamily="2" charset="0"/>
-              </a:rPr>
-              <a:t>Premise</a:t>
-            </a:r>
-            <a:endParaRPr lang="de-CH" sz="1600" dirty="0"/>
-          </a:p>
-        </p:txBody>
-      </p:sp>
-    </p:spTree>
-    <p:extLst>
-      <p:ext uri="{BB962C8B-B14F-4D97-AF65-F5344CB8AC3E}">
-        <p14:creationId xmlns:p14="http://schemas.microsoft.com/office/powerpoint/2010/main" val="1358001949"/>
-      </p:ext>
-    </p:extLst>
-  </p:cSld>
-  <p:clrMapOvr>
-    <a:masterClrMapping/>
-  </p:clrMapOvr>
-</p:sld>
-</file>
-
-<file path=ppt/slides/slide40.xml><?xml version="1.0" encoding="utf-8"?>
+<file path=ppt/slides/slide41.xml><?xml version="1.0" encoding="utf-8"?>
 <p:sld xmlns:a="http://schemas.openxmlformats.org/drawingml/2006/main" xmlns:r="http://schemas.openxmlformats.org/officeDocument/2006/relationships" xmlns:p="http://schemas.openxmlformats.org/presentationml/2006/main">
   <p:cSld>
     <p:spTree>
@@ -40525,7 +40797,7 @@
         <p:spPr>
           <a:xfrm>
             <a:off x="8002959" y="2814674"/>
-            <a:ext cx="3844322" cy="1077218"/>
+            <a:ext cx="3254417" cy="1077218"/>
           </a:xfrm>
           <a:prstGeom prst="rect">
             <a:avLst/>
@@ -40544,7 +40816,7 @@
                 </a:solidFill>
                 <a:latin typeface="Yanone Kaffeesatz Regular" panose="02000000000000000000" pitchFamily="2" charset="0"/>
               </a:rPr>
-              <a:t>04:36:52:087:: Entering wait</a:t>
+              <a:t>04:36:52: Entering wait</a:t>
             </a:r>
           </a:p>
           <a:p>
@@ -40555,7 +40827,7 @@
                 </a:solidFill>
                 <a:latin typeface="Yanone Kaffeesatz Regular" panose="02000000000000000000" pitchFamily="2" charset="0"/>
               </a:rPr>
-              <a:t>04:36:54:094: Continue</a:t>
+              <a:t>04:36:54: Continue</a:t>
             </a:r>
           </a:p>
         </p:txBody>
@@ -40668,7 +40940,7 @@
 </p:sld>
 </file>
 
-<file path=ppt/slides/slide41.xml><?xml version="1.0" encoding="utf-8"?>
+<file path=ppt/slides/slide42.xml><?xml version="1.0" encoding="utf-8"?>
 <p:sld xmlns:a="http://schemas.openxmlformats.org/drawingml/2006/main" xmlns:r="http://schemas.openxmlformats.org/officeDocument/2006/relationships" xmlns:p="http://schemas.openxmlformats.org/presentationml/2006/main">
   <p:cSld>
     <p:spTree>
@@ -40935,7 +41207,7 @@
 </p:sld>
 </file>
 
-<file path=ppt/slides/slide42.xml><?xml version="1.0" encoding="utf-8"?>
+<file path=ppt/slides/slide43.xml><?xml version="1.0" encoding="utf-8"?>
 <p:sld xmlns:a="http://schemas.openxmlformats.org/drawingml/2006/main" xmlns:r="http://schemas.openxmlformats.org/officeDocument/2006/relationships" xmlns:p="http://schemas.openxmlformats.org/presentationml/2006/main">
   <p:cSld>
     <p:spTree>
@@ -41178,7 +41450,7 @@
 </p:sld>
 </file>
 
-<file path=ppt/slides/slide43.xml><?xml version="1.0" encoding="utf-8"?>
+<file path=ppt/slides/slide44.xml><?xml version="1.0" encoding="utf-8"?>
 <p:sld xmlns:a="http://schemas.openxmlformats.org/drawingml/2006/main" xmlns:r="http://schemas.openxmlformats.org/officeDocument/2006/relationships" xmlns:p="http://schemas.openxmlformats.org/presentationml/2006/main">
   <p:cSld>
     <p:spTree>
@@ -41800,7 +42072,7 @@
 </p:sld>
 </file>
 
-<file path=ppt/slides/slide44.xml><?xml version="1.0" encoding="utf-8"?>
+<file path=ppt/slides/slide45.xml><?xml version="1.0" encoding="utf-8"?>
 <p:sld xmlns:a="http://schemas.openxmlformats.org/drawingml/2006/main" xmlns:r="http://schemas.openxmlformats.org/officeDocument/2006/relationships" xmlns:p="http://schemas.openxmlformats.org/presentationml/2006/main">
   <p:cSld>
     <p:spTree>
@@ -42266,7 +42538,7 @@
 </p:sld>
 </file>
 
-<file path=ppt/slides/slide45.xml><?xml version="1.0" encoding="utf-8"?>
+<file path=ppt/slides/slide46.xml><?xml version="1.0" encoding="utf-8"?>
 <p:sld xmlns:a="http://schemas.openxmlformats.org/drawingml/2006/main" xmlns:r="http://schemas.openxmlformats.org/officeDocument/2006/relationships" xmlns:p="http://schemas.openxmlformats.org/presentationml/2006/main">
   <p:cSld>
     <p:spTree>
@@ -42761,7 +43033,7 @@
 </p:sld>
 </file>
 
-<file path=ppt/slides/slide46.xml><?xml version="1.0" encoding="utf-8"?>
+<file path=ppt/slides/slide47.xml><?xml version="1.0" encoding="utf-8"?>
 <p:sld xmlns:a="http://schemas.openxmlformats.org/drawingml/2006/main" xmlns:r="http://schemas.openxmlformats.org/officeDocument/2006/relationships" xmlns:p="http://schemas.openxmlformats.org/presentationml/2006/main">
   <p:cSld>
     <p:spTree>
@@ -43021,7 +43293,7 @@
 </p:sld>
 </file>
 
-<file path=ppt/slides/slide47.xml><?xml version="1.0" encoding="utf-8"?>
+<file path=ppt/slides/slide48.xml><?xml version="1.0" encoding="utf-8"?>
 <p:sld xmlns:a="http://schemas.openxmlformats.org/drawingml/2006/main" xmlns:r="http://schemas.openxmlformats.org/officeDocument/2006/relationships" xmlns:p="http://schemas.openxmlformats.org/presentationml/2006/main">
   <p:cSld>
     <p:spTree>
@@ -43643,7 +43915,7 @@
 </p:sld>
 </file>
 
-<file path=ppt/slides/slide48.xml><?xml version="1.0" encoding="utf-8"?>
+<file path=ppt/slides/slide49.xml><?xml version="1.0" encoding="utf-8"?>
 <p:sld xmlns:a="http://schemas.openxmlformats.org/drawingml/2006/main" xmlns:r="http://schemas.openxmlformats.org/officeDocument/2006/relationships" xmlns:p="http://schemas.openxmlformats.org/presentationml/2006/main">
   <p:cSld>
     <p:spTree>
@@ -43686,436 +43958,6 @@
     <p:extLst>
       <p:ext uri="{BB962C8B-B14F-4D97-AF65-F5344CB8AC3E}">
         <p14:creationId xmlns:p14="http://schemas.microsoft.com/office/powerpoint/2010/main" val="787582663"/>
-      </p:ext>
-    </p:extLst>
-  </p:cSld>
-  <p:clrMapOvr>
-    <a:masterClrMapping/>
-  </p:clrMapOvr>
-</p:sld>
-</file>
-
-<file path=ppt/slides/slide49.xml><?xml version="1.0" encoding="utf-8"?>
-<p:sld xmlns:a="http://schemas.openxmlformats.org/drawingml/2006/main" xmlns:r="http://schemas.openxmlformats.org/officeDocument/2006/relationships" xmlns:p="http://schemas.openxmlformats.org/presentationml/2006/main">
-  <p:cSld>
-    <p:spTree>
-      <p:nvGrpSpPr>
-        <p:cNvPr id="1" name=""/>
-        <p:cNvGrpSpPr/>
-        <p:nvPr/>
-      </p:nvGrpSpPr>
-      <p:grpSpPr>
-        <a:xfrm>
-          <a:off x="0" y="0"/>
-          <a:ext cx="0" cy="0"/>
-          <a:chOff x="0" y="0"/>
-          <a:chExt cx="0" cy="0"/>
-        </a:xfrm>
-      </p:grpSpPr>
-      <p:sp>
-        <p:nvSpPr>
-          <p:cNvPr id="2" name="Rectangle 1"/>
-          <p:cNvSpPr/>
-          <p:nvPr/>
-        </p:nvSpPr>
-        <p:spPr>
-          <a:xfrm>
-            <a:off x="6787584" y="1283074"/>
-            <a:ext cx="3357526" cy="4291852"/>
-          </a:xfrm>
-          <a:prstGeom prst="rect">
-            <a:avLst/>
-          </a:prstGeom>
-          <a:solidFill>
-            <a:schemeClr val="bg1"/>
-          </a:solidFill>
-          <a:ln>
-            <a:solidFill>
-              <a:schemeClr val="tx2"/>
-            </a:solidFill>
-          </a:ln>
-        </p:spPr>
-        <p:style>
-          <a:lnRef idx="2">
-            <a:schemeClr val="accent1">
-              <a:shade val="50000"/>
-            </a:schemeClr>
-          </a:lnRef>
-          <a:fillRef idx="1">
-            <a:schemeClr val="accent1"/>
-          </a:fillRef>
-          <a:effectRef idx="0">
-            <a:schemeClr val="accent1"/>
-          </a:effectRef>
-          <a:fontRef idx="minor">
-            <a:schemeClr val="lt1"/>
-          </a:fontRef>
-        </p:style>
-        <p:txBody>
-          <a:bodyPr rtlCol="0" anchor="ctr"/>
-          <a:lstStyle/>
-          <a:p>
-            <a:pPr algn="ctr"/>
-            <a:endParaRPr lang="de-CH"/>
-          </a:p>
-        </p:txBody>
-      </p:sp>
-      <p:cxnSp>
-        <p:nvCxnSpPr>
-          <p:cNvPr id="3" name="Straight Arrow Connector 2"/>
-          <p:cNvCxnSpPr/>
-          <p:nvPr/>
-        </p:nvCxnSpPr>
-        <p:spPr>
-          <a:xfrm flipH="1" flipV="1">
-            <a:off x="9863960" y="3675993"/>
-            <a:ext cx="13137" cy="1747345"/>
-          </a:xfrm>
-          <a:prstGeom prst="straightConnector1">
-            <a:avLst/>
-          </a:prstGeom>
-          <a:ln w="57150">
-            <a:solidFill>
-              <a:schemeClr val="accent4"/>
-            </a:solidFill>
-            <a:tailEnd type="triangle"/>
-          </a:ln>
-        </p:spPr>
-        <p:style>
-          <a:lnRef idx="1">
-            <a:schemeClr val="accent1"/>
-          </a:lnRef>
-          <a:fillRef idx="0">
-            <a:schemeClr val="accent1"/>
-          </a:fillRef>
-          <a:effectRef idx="0">
-            <a:schemeClr val="accent1"/>
-          </a:effectRef>
-          <a:fontRef idx="minor">
-            <a:schemeClr val="tx1"/>
-          </a:fontRef>
-        </p:style>
-      </p:cxnSp>
-      <p:sp>
-        <p:nvSpPr>
-          <p:cNvPr id="4" name="Rectangle 3"/>
-          <p:cNvSpPr/>
-          <p:nvPr/>
-        </p:nvSpPr>
-        <p:spPr>
-          <a:xfrm>
-            <a:off x="6787584" y="491106"/>
-            <a:ext cx="2814674" cy="707886"/>
-          </a:xfrm>
-          <a:prstGeom prst="rect">
-            <a:avLst/>
-          </a:prstGeom>
-        </p:spPr>
-        <p:txBody>
-          <a:bodyPr wrap="square">
-            <a:spAutoFit/>
-          </a:bodyPr>
-          <a:lstStyle/>
-          <a:p>
-            <a:r>
-              <a:rPr lang="en-US" sz="4000" dirty="0">
-                <a:solidFill>
-                  <a:schemeClr val="accent2"/>
-                </a:solidFill>
-                <a:latin typeface="Yanone Kaffeesatz Regular" panose="02000000000000000000" pitchFamily="2" charset="0"/>
-              </a:rPr>
-              <a:t>High-level Spike</a:t>
-            </a:r>
-            <a:endParaRPr lang="de-CH" sz="500" dirty="0"/>
-          </a:p>
-        </p:txBody>
-      </p:sp>
-      <p:sp>
-        <p:nvSpPr>
-          <p:cNvPr id="5" name="Rectangle 4"/>
-          <p:cNvSpPr/>
-          <p:nvPr/>
-        </p:nvSpPr>
-        <p:spPr>
-          <a:xfrm>
-            <a:off x="7330436" y="5574926"/>
-            <a:ext cx="2814674" cy="707886"/>
-          </a:xfrm>
-          <a:prstGeom prst="rect">
-            <a:avLst/>
-          </a:prstGeom>
-        </p:spPr>
-        <p:txBody>
-          <a:bodyPr wrap="square">
-            <a:spAutoFit/>
-          </a:bodyPr>
-          <a:lstStyle/>
-          <a:p>
-            <a:pPr algn="r"/>
-            <a:r>
-              <a:rPr lang="en-US" sz="4000" dirty="0">
-                <a:solidFill>
-                  <a:schemeClr val="accent2"/>
-                </a:solidFill>
-                <a:latin typeface="Yanone Kaffeesatz Regular" panose="02000000000000000000" pitchFamily="2" charset="0"/>
-              </a:rPr>
-              <a:t>Low-level Spike</a:t>
-            </a:r>
-            <a:endParaRPr lang="de-CH" sz="500" dirty="0"/>
-          </a:p>
-        </p:txBody>
-      </p:sp>
-      <p:sp>
-        <p:nvSpPr>
-          <p:cNvPr id="6" name="Rectangle 5"/>
-          <p:cNvSpPr/>
-          <p:nvPr/>
-        </p:nvSpPr>
-        <p:spPr>
-          <a:xfrm>
-            <a:off x="0" y="2705725"/>
-            <a:ext cx="4999912" cy="2800767"/>
-          </a:xfrm>
-          <a:prstGeom prst="rect">
-            <a:avLst/>
-          </a:prstGeom>
-        </p:spPr>
-        <p:txBody>
-          <a:bodyPr wrap="square">
-            <a:spAutoFit/>
-          </a:bodyPr>
-          <a:lstStyle/>
-          <a:p>
-            <a:pPr algn="ctr"/>
-            <a:r>
-              <a:rPr lang="en-US" sz="8800" dirty="0">
-                <a:solidFill>
-                  <a:schemeClr val="accent2"/>
-                </a:solidFill>
-                <a:latin typeface="Yanone Kaffeesatz Regular" panose="02000000000000000000" pitchFamily="2" charset="0"/>
-              </a:rPr>
-              <a:t>Bring it together</a:t>
-            </a:r>
-            <a:endParaRPr lang="de-CH" sz="1200" dirty="0"/>
-          </a:p>
-        </p:txBody>
-      </p:sp>
-      <p:sp>
-        <p:nvSpPr>
-          <p:cNvPr id="7" name="Rectangle 6"/>
-          <p:cNvSpPr/>
-          <p:nvPr/>
-        </p:nvSpPr>
-        <p:spPr>
-          <a:xfrm>
-            <a:off x="6959690" y="3173715"/>
-            <a:ext cx="2700630" cy="472154"/>
-          </a:xfrm>
-          <a:prstGeom prst="rect">
-            <a:avLst/>
-          </a:prstGeom>
-          <a:solidFill>
-            <a:schemeClr val="bg1"/>
-          </a:solidFill>
-          <a:ln>
-            <a:solidFill>
-              <a:schemeClr val="tx2"/>
-            </a:solidFill>
-          </a:ln>
-        </p:spPr>
-        <p:style>
-          <a:lnRef idx="2">
-            <a:schemeClr val="accent1">
-              <a:shade val="50000"/>
-            </a:schemeClr>
-          </a:lnRef>
-          <a:fillRef idx="1">
-            <a:schemeClr val="accent1"/>
-          </a:fillRef>
-          <a:effectRef idx="0">
-            <a:schemeClr val="accent1"/>
-          </a:effectRef>
-          <a:fontRef idx="minor">
-            <a:schemeClr val="lt1"/>
-          </a:fontRef>
-        </p:style>
-        <p:txBody>
-          <a:bodyPr rtlCol="0" anchor="ctr"/>
-          <a:lstStyle/>
-          <a:p>
-            <a:pPr algn="ctr"/>
-            <a:endParaRPr lang="de-CH" dirty="0">
-              <a:solidFill>
-                <a:schemeClr val="tx2"/>
-              </a:solidFill>
-              <a:latin typeface="Yanone Kaffeesatz Regular" panose="02000000000000000000" pitchFamily="2" charset="0"/>
-            </a:endParaRPr>
-          </a:p>
-        </p:txBody>
-      </p:sp>
-      <p:sp>
-        <p:nvSpPr>
-          <p:cNvPr id="8" name="Rectangle 7"/>
-          <p:cNvSpPr/>
-          <p:nvPr/>
-        </p:nvSpPr>
-        <p:spPr>
-          <a:xfrm>
-            <a:off x="6959690" y="3753445"/>
-            <a:ext cx="2700630" cy="472154"/>
-          </a:xfrm>
-          <a:prstGeom prst="rect">
-            <a:avLst/>
-          </a:prstGeom>
-          <a:solidFill>
-            <a:schemeClr val="bg1"/>
-          </a:solidFill>
-          <a:ln>
-            <a:solidFill>
-              <a:schemeClr val="tx2"/>
-            </a:solidFill>
-          </a:ln>
-        </p:spPr>
-        <p:style>
-          <a:lnRef idx="2">
-            <a:schemeClr val="accent1">
-              <a:shade val="50000"/>
-            </a:schemeClr>
-          </a:lnRef>
-          <a:fillRef idx="1">
-            <a:schemeClr val="accent1"/>
-          </a:fillRef>
-          <a:effectRef idx="0">
-            <a:schemeClr val="accent1"/>
-          </a:effectRef>
-          <a:fontRef idx="minor">
-            <a:schemeClr val="lt1"/>
-          </a:fontRef>
-        </p:style>
-        <p:txBody>
-          <a:bodyPr rtlCol="0" anchor="ctr"/>
-          <a:lstStyle/>
-          <a:p>
-            <a:pPr algn="ctr"/>
-            <a:endParaRPr lang="de-CH" dirty="0">
-              <a:solidFill>
-                <a:schemeClr val="tx2"/>
-              </a:solidFill>
-              <a:latin typeface="Yanone Kaffeesatz Regular" panose="02000000000000000000" pitchFamily="2" charset="0"/>
-            </a:endParaRPr>
-          </a:p>
-        </p:txBody>
-      </p:sp>
-      <p:sp>
-        <p:nvSpPr>
-          <p:cNvPr id="9" name="Rectangle 8"/>
-          <p:cNvSpPr/>
-          <p:nvPr/>
-        </p:nvSpPr>
-        <p:spPr>
-          <a:xfrm>
-            <a:off x="6959690" y="4873731"/>
-            <a:ext cx="2700630" cy="472154"/>
-          </a:xfrm>
-          <a:prstGeom prst="rect">
-            <a:avLst/>
-          </a:prstGeom>
-          <a:solidFill>
-            <a:schemeClr val="bg1"/>
-          </a:solidFill>
-          <a:ln>
-            <a:solidFill>
-              <a:schemeClr val="tx2"/>
-            </a:solidFill>
-          </a:ln>
-        </p:spPr>
-        <p:style>
-          <a:lnRef idx="2">
-            <a:schemeClr val="accent1">
-              <a:shade val="50000"/>
-            </a:schemeClr>
-          </a:lnRef>
-          <a:fillRef idx="1">
-            <a:schemeClr val="accent1"/>
-          </a:fillRef>
-          <a:effectRef idx="0">
-            <a:schemeClr val="accent1"/>
-          </a:effectRef>
-          <a:fontRef idx="minor">
-            <a:schemeClr val="lt1"/>
-          </a:fontRef>
-        </p:style>
-        <p:txBody>
-          <a:bodyPr rtlCol="0" anchor="ctr"/>
-          <a:lstStyle/>
-          <a:p>
-            <a:pPr algn="ctr"/>
-            <a:endParaRPr lang="de-CH" dirty="0">
-              <a:solidFill>
-                <a:schemeClr val="tx2"/>
-              </a:solidFill>
-              <a:latin typeface="Yanone Kaffeesatz Regular" panose="02000000000000000000" pitchFamily="2" charset="0"/>
-            </a:endParaRPr>
-          </a:p>
-        </p:txBody>
-      </p:sp>
-      <p:sp>
-        <p:nvSpPr>
-          <p:cNvPr id="10" name="Rectangle 9"/>
-          <p:cNvSpPr/>
-          <p:nvPr/>
-        </p:nvSpPr>
-        <p:spPr>
-          <a:xfrm>
-            <a:off x="6959690" y="4313588"/>
-            <a:ext cx="2700630" cy="472154"/>
-          </a:xfrm>
-          <a:prstGeom prst="rect">
-            <a:avLst/>
-          </a:prstGeom>
-          <a:solidFill>
-            <a:schemeClr val="bg1"/>
-          </a:solidFill>
-          <a:ln>
-            <a:solidFill>
-              <a:schemeClr val="tx2"/>
-            </a:solidFill>
-          </a:ln>
-        </p:spPr>
-        <p:style>
-          <a:lnRef idx="2">
-            <a:schemeClr val="accent1">
-              <a:shade val="50000"/>
-            </a:schemeClr>
-          </a:lnRef>
-          <a:fillRef idx="1">
-            <a:schemeClr val="accent1"/>
-          </a:fillRef>
-          <a:effectRef idx="0">
-            <a:schemeClr val="accent1"/>
-          </a:effectRef>
-          <a:fontRef idx="minor">
-            <a:schemeClr val="lt1"/>
-          </a:fontRef>
-        </p:style>
-        <p:txBody>
-          <a:bodyPr rtlCol="0" anchor="ctr"/>
-          <a:lstStyle/>
-          <a:p>
-            <a:pPr algn="ctr"/>
-            <a:endParaRPr lang="de-CH" dirty="0">
-              <a:solidFill>
-                <a:schemeClr val="tx2"/>
-              </a:solidFill>
-              <a:latin typeface="Yanone Kaffeesatz Regular" panose="02000000000000000000" pitchFamily="2" charset="0"/>
-            </a:endParaRPr>
-          </a:p>
-        </p:txBody>
-      </p:sp>
-    </p:spTree>
-    <p:extLst>
-      <p:ext uri="{BB962C8B-B14F-4D97-AF65-F5344CB8AC3E}">
-        <p14:creationId xmlns:p14="http://schemas.microsoft.com/office/powerpoint/2010/main" val="1194955735"/>
       </p:ext>
     </p:extLst>
   </p:cSld>
@@ -44306,7 +44148,7 @@
                 </a:solidFill>
                 <a:latin typeface="Yanone Kaffeesatz Regular" panose="02000000000000000000" pitchFamily="2" charset="0"/>
               </a:rPr>
-              <a:t>High-level Spike</a:t>
+              <a:t>High-level</a:t>
             </a:r>
             <a:endParaRPr lang="de-CH" sz="500" dirty="0"/>
           </a:p>
@@ -44341,7 +44183,7 @@
                 </a:solidFill>
                 <a:latin typeface="Yanone Kaffeesatz Regular" panose="02000000000000000000" pitchFamily="2" charset="0"/>
               </a:rPr>
-              <a:t>Low-level Spike</a:t>
+              <a:t>Low-level</a:t>
             </a:r>
             <a:endParaRPr lang="de-CH" sz="500" dirty="0"/>
           </a:p>
@@ -44597,7 +44439,7 @@
     </p:spTree>
     <p:extLst>
       <p:ext uri="{BB962C8B-B14F-4D97-AF65-F5344CB8AC3E}">
-        <p14:creationId xmlns:p14="http://schemas.microsoft.com/office/powerpoint/2010/main" val="1832614821"/>
+        <p14:creationId xmlns:p14="http://schemas.microsoft.com/office/powerpoint/2010/main" val="1194955735"/>
       </p:ext>
     </p:extLst>
   </p:cSld>

</xml_diff>